<commit_message>
All content is there.  Now Annie will help me arrange it.
</commit_message>
<xml_diff>
--- a/WHITEPAPER/IPDPS2014Poster.pptx
+++ b/WHITEPAPER/IPDPS2014Poster.pptx
@@ -4,6 +4,9 @@
   <p:sldMasterIdLst>
     <p:sldMasterId id="2147483708" r:id="rId1"/>
   </p:sldMasterIdLst>
+  <p:notesMasterIdLst>
+    <p:notesMasterId r:id="rId3"/>
+  </p:notesMasterIdLst>
   <p:sldIdLst>
     <p:sldId id="256" r:id="rId2"/>
   </p:sldIdLst>
@@ -121,6 +124,440 @@
     </p:ext>
   </p:extLst>
 </p:presentation>
+</file>
+
+<file path=ppt/notesMasters/notesMaster1.xml><?xml version="1.0" encoding="utf-8"?>
+<p:notesMaster xmlns:a="http://schemas.openxmlformats.org/drawingml/2006/main" xmlns:r="http://schemas.openxmlformats.org/officeDocument/2006/relationships" xmlns:p="http://schemas.openxmlformats.org/presentationml/2006/main">
+  <p:cSld>
+    <p:bg>
+      <p:bgRef idx="1001">
+        <a:schemeClr val="bg1"/>
+      </p:bgRef>
+    </p:bg>
+    <p:spTree>
+      <p:nvGrpSpPr>
+        <p:cNvPr id="1" name=""/>
+        <p:cNvGrpSpPr/>
+        <p:nvPr/>
+      </p:nvGrpSpPr>
+      <p:grpSpPr>
+        <a:xfrm>
+          <a:off x="0" y="0"/>
+          <a:ext cx="0" cy="0"/>
+          <a:chOff x="0" y="0"/>
+          <a:chExt cx="0" cy="0"/>
+        </a:xfrm>
+      </p:grpSpPr>
+      <p:sp>
+        <p:nvSpPr>
+          <p:cNvPr id="2" name="Header Placeholder 1"/>
+          <p:cNvSpPr>
+            <a:spLocks noGrp="1"/>
+          </p:cNvSpPr>
+          <p:nvPr>
+            <p:ph type="hdr" sz="quarter"/>
+          </p:nvPr>
+        </p:nvSpPr>
+        <p:spPr>
+          <a:xfrm>
+            <a:off x="0" y="0"/>
+            <a:ext cx="2971800" cy="458788"/>
+          </a:xfrm>
+          <a:prstGeom prst="rect">
+            <a:avLst/>
+          </a:prstGeom>
+        </p:spPr>
+        <p:txBody>
+          <a:bodyPr vert="horz" lIns="91440" tIns="45720" rIns="91440" bIns="45720" rtlCol="0"/>
+          <a:lstStyle>
+            <a:lvl1pPr algn="l">
+              <a:defRPr sz="1200"/>
+            </a:lvl1pPr>
+          </a:lstStyle>
+          <a:p>
+            <a:endParaRPr lang="en-US"/>
+          </a:p>
+        </p:txBody>
+      </p:sp>
+      <p:sp>
+        <p:nvSpPr>
+          <p:cNvPr id="3" name="Date Placeholder 2"/>
+          <p:cNvSpPr>
+            <a:spLocks noGrp="1"/>
+          </p:cNvSpPr>
+          <p:nvPr>
+            <p:ph type="dt" idx="1"/>
+          </p:nvPr>
+        </p:nvSpPr>
+        <p:spPr>
+          <a:xfrm>
+            <a:off x="3884613" y="0"/>
+            <a:ext cx="2971800" cy="458788"/>
+          </a:xfrm>
+          <a:prstGeom prst="rect">
+            <a:avLst/>
+          </a:prstGeom>
+        </p:spPr>
+        <p:txBody>
+          <a:bodyPr vert="horz" lIns="91440" tIns="45720" rIns="91440" bIns="45720" rtlCol="0"/>
+          <a:lstStyle>
+            <a:lvl1pPr algn="r">
+              <a:defRPr sz="1200"/>
+            </a:lvl1pPr>
+          </a:lstStyle>
+          <a:p>
+            <a:fld id="{FF7BAFEA-2AAC-4A92-8557-DB01BB15B18C}" type="datetimeFigureOut">
+              <a:rPr lang="en-US" smtClean="0"/>
+              <a:t>5/9/2014</a:t>
+            </a:fld>
+            <a:endParaRPr lang="en-US"/>
+          </a:p>
+        </p:txBody>
+      </p:sp>
+      <p:sp>
+        <p:nvSpPr>
+          <p:cNvPr id="4" name="Slide Image Placeholder 3"/>
+          <p:cNvSpPr>
+            <a:spLocks noGrp="1" noRot="1" noChangeAspect="1"/>
+          </p:cNvSpPr>
+          <p:nvPr>
+            <p:ph type="sldImg" idx="2"/>
+          </p:nvPr>
+        </p:nvSpPr>
+        <p:spPr>
+          <a:xfrm>
+            <a:off x="1500188" y="1143000"/>
+            <a:ext cx="3857625" cy="3086100"/>
+          </a:xfrm>
+          <a:prstGeom prst="rect">
+            <a:avLst/>
+          </a:prstGeom>
+          <a:noFill/>
+          <a:ln w="12700">
+            <a:solidFill>
+              <a:prstClr val="black"/>
+            </a:solidFill>
+          </a:ln>
+        </p:spPr>
+        <p:txBody>
+          <a:bodyPr vert="horz" lIns="91440" tIns="45720" rIns="91440" bIns="45720" rtlCol="0" anchor="ctr"/>
+          <a:lstStyle/>
+          <a:p>
+            <a:endParaRPr lang="en-US"/>
+          </a:p>
+        </p:txBody>
+      </p:sp>
+      <p:sp>
+        <p:nvSpPr>
+          <p:cNvPr id="5" name="Notes Placeholder 4"/>
+          <p:cNvSpPr>
+            <a:spLocks noGrp="1"/>
+          </p:cNvSpPr>
+          <p:nvPr>
+            <p:ph type="body" sz="quarter" idx="3"/>
+          </p:nvPr>
+        </p:nvSpPr>
+        <p:spPr>
+          <a:xfrm>
+            <a:off x="685800" y="4400550"/>
+            <a:ext cx="5486400" cy="3600450"/>
+          </a:xfrm>
+          <a:prstGeom prst="rect">
+            <a:avLst/>
+          </a:prstGeom>
+        </p:spPr>
+        <p:txBody>
+          <a:bodyPr vert="horz" lIns="91440" tIns="45720" rIns="91440" bIns="45720" rtlCol="0"/>
+          <a:lstStyle/>
+          <a:p>
+            <a:pPr lvl="0"/>
+            <a:r>
+              <a:rPr lang="en-US" smtClean="0"/>
+              <a:t>Click to edit Master text styles</a:t>
+            </a:r>
+          </a:p>
+          <a:p>
+            <a:pPr lvl="1"/>
+            <a:r>
+              <a:rPr lang="en-US" smtClean="0"/>
+              <a:t>Second level</a:t>
+            </a:r>
+          </a:p>
+          <a:p>
+            <a:pPr lvl="2"/>
+            <a:r>
+              <a:rPr lang="en-US" smtClean="0"/>
+              <a:t>Third level</a:t>
+            </a:r>
+          </a:p>
+          <a:p>
+            <a:pPr lvl="3"/>
+            <a:r>
+              <a:rPr lang="en-US" smtClean="0"/>
+              <a:t>Fourth level</a:t>
+            </a:r>
+          </a:p>
+          <a:p>
+            <a:pPr lvl="4"/>
+            <a:r>
+              <a:rPr lang="en-US" smtClean="0"/>
+              <a:t>Fifth level</a:t>
+            </a:r>
+            <a:endParaRPr lang="en-US"/>
+          </a:p>
+        </p:txBody>
+      </p:sp>
+      <p:sp>
+        <p:nvSpPr>
+          <p:cNvPr id="6" name="Footer Placeholder 5"/>
+          <p:cNvSpPr>
+            <a:spLocks noGrp="1"/>
+          </p:cNvSpPr>
+          <p:nvPr>
+            <p:ph type="ftr" sz="quarter" idx="4"/>
+          </p:nvPr>
+        </p:nvSpPr>
+        <p:spPr>
+          <a:xfrm>
+            <a:off x="0" y="8685213"/>
+            <a:ext cx="2971800" cy="458787"/>
+          </a:xfrm>
+          <a:prstGeom prst="rect">
+            <a:avLst/>
+          </a:prstGeom>
+        </p:spPr>
+        <p:txBody>
+          <a:bodyPr vert="horz" lIns="91440" tIns="45720" rIns="91440" bIns="45720" rtlCol="0" anchor="b"/>
+          <a:lstStyle>
+            <a:lvl1pPr algn="l">
+              <a:defRPr sz="1200"/>
+            </a:lvl1pPr>
+          </a:lstStyle>
+          <a:p>
+            <a:endParaRPr lang="en-US"/>
+          </a:p>
+        </p:txBody>
+      </p:sp>
+      <p:sp>
+        <p:nvSpPr>
+          <p:cNvPr id="7" name="Slide Number Placeholder 6"/>
+          <p:cNvSpPr>
+            <a:spLocks noGrp="1"/>
+          </p:cNvSpPr>
+          <p:nvPr>
+            <p:ph type="sldNum" sz="quarter" idx="5"/>
+          </p:nvPr>
+        </p:nvSpPr>
+        <p:spPr>
+          <a:xfrm>
+            <a:off x="3884613" y="8685213"/>
+            <a:ext cx="2971800" cy="458787"/>
+          </a:xfrm>
+          <a:prstGeom prst="rect">
+            <a:avLst/>
+          </a:prstGeom>
+        </p:spPr>
+        <p:txBody>
+          <a:bodyPr vert="horz" lIns="91440" tIns="45720" rIns="91440" bIns="45720" rtlCol="0" anchor="b"/>
+          <a:lstStyle>
+            <a:lvl1pPr algn="r">
+              <a:defRPr sz="1200"/>
+            </a:lvl1pPr>
+          </a:lstStyle>
+          <a:p>
+            <a:fld id="{762C5060-B157-4FD7-B73C-E89D7819CCFA}" type="slidenum">
+              <a:rPr lang="en-US" smtClean="0"/>
+              <a:t>‹#›</a:t>
+            </a:fld>
+            <a:endParaRPr lang="en-US"/>
+          </a:p>
+        </p:txBody>
+      </p:sp>
+    </p:spTree>
+    <p:extLst>
+      <p:ext uri="{BB962C8B-B14F-4D97-AF65-F5344CB8AC3E}">
+        <p14:creationId xmlns:p14="http://schemas.microsoft.com/office/powerpoint/2010/main" val="918385486"/>
+      </p:ext>
+    </p:extLst>
+  </p:cSld>
+  <p:clrMap bg1="lt1" tx1="dk1" bg2="lt2" tx2="dk2" accent1="accent1" accent2="accent2" accent3="accent3" accent4="accent4" accent5="accent5" accent6="accent6" hlink="hlink" folHlink="folHlink"/>
+  <p:notesStyle>
+    <a:lvl1pPr marL="0" algn="l" defTabSz="914400" rtl="0" eaLnBrk="1" latinLnBrk="0" hangingPunct="1">
+      <a:defRPr sz="1200" kern="1200">
+        <a:solidFill>
+          <a:schemeClr val="tx1"/>
+        </a:solidFill>
+        <a:latin typeface="+mn-lt"/>
+        <a:ea typeface="+mn-ea"/>
+        <a:cs typeface="+mn-cs"/>
+      </a:defRPr>
+    </a:lvl1pPr>
+    <a:lvl2pPr marL="457200" algn="l" defTabSz="914400" rtl="0" eaLnBrk="1" latinLnBrk="0" hangingPunct="1">
+      <a:defRPr sz="1200" kern="1200">
+        <a:solidFill>
+          <a:schemeClr val="tx1"/>
+        </a:solidFill>
+        <a:latin typeface="+mn-lt"/>
+        <a:ea typeface="+mn-ea"/>
+        <a:cs typeface="+mn-cs"/>
+      </a:defRPr>
+    </a:lvl2pPr>
+    <a:lvl3pPr marL="914400" algn="l" defTabSz="914400" rtl="0" eaLnBrk="1" latinLnBrk="0" hangingPunct="1">
+      <a:defRPr sz="1200" kern="1200">
+        <a:solidFill>
+          <a:schemeClr val="tx1"/>
+        </a:solidFill>
+        <a:latin typeface="+mn-lt"/>
+        <a:ea typeface="+mn-ea"/>
+        <a:cs typeface="+mn-cs"/>
+      </a:defRPr>
+    </a:lvl3pPr>
+    <a:lvl4pPr marL="1371600" algn="l" defTabSz="914400" rtl="0" eaLnBrk="1" latinLnBrk="0" hangingPunct="1">
+      <a:defRPr sz="1200" kern="1200">
+        <a:solidFill>
+          <a:schemeClr val="tx1"/>
+        </a:solidFill>
+        <a:latin typeface="+mn-lt"/>
+        <a:ea typeface="+mn-ea"/>
+        <a:cs typeface="+mn-cs"/>
+      </a:defRPr>
+    </a:lvl4pPr>
+    <a:lvl5pPr marL="1828800" algn="l" defTabSz="914400" rtl="0" eaLnBrk="1" latinLnBrk="0" hangingPunct="1">
+      <a:defRPr sz="1200" kern="1200">
+        <a:solidFill>
+          <a:schemeClr val="tx1"/>
+        </a:solidFill>
+        <a:latin typeface="+mn-lt"/>
+        <a:ea typeface="+mn-ea"/>
+        <a:cs typeface="+mn-cs"/>
+      </a:defRPr>
+    </a:lvl5pPr>
+    <a:lvl6pPr marL="2286000" algn="l" defTabSz="914400" rtl="0" eaLnBrk="1" latinLnBrk="0" hangingPunct="1">
+      <a:defRPr sz="1200" kern="1200">
+        <a:solidFill>
+          <a:schemeClr val="tx1"/>
+        </a:solidFill>
+        <a:latin typeface="+mn-lt"/>
+        <a:ea typeface="+mn-ea"/>
+        <a:cs typeface="+mn-cs"/>
+      </a:defRPr>
+    </a:lvl6pPr>
+    <a:lvl7pPr marL="2743200" algn="l" defTabSz="914400" rtl="0" eaLnBrk="1" latinLnBrk="0" hangingPunct="1">
+      <a:defRPr sz="1200" kern="1200">
+        <a:solidFill>
+          <a:schemeClr val="tx1"/>
+        </a:solidFill>
+        <a:latin typeface="+mn-lt"/>
+        <a:ea typeface="+mn-ea"/>
+        <a:cs typeface="+mn-cs"/>
+      </a:defRPr>
+    </a:lvl7pPr>
+    <a:lvl8pPr marL="3200400" algn="l" defTabSz="914400" rtl="0" eaLnBrk="1" latinLnBrk="0" hangingPunct="1">
+      <a:defRPr sz="1200" kern="1200">
+        <a:solidFill>
+          <a:schemeClr val="tx1"/>
+        </a:solidFill>
+        <a:latin typeface="+mn-lt"/>
+        <a:ea typeface="+mn-ea"/>
+        <a:cs typeface="+mn-cs"/>
+      </a:defRPr>
+    </a:lvl8pPr>
+    <a:lvl9pPr marL="3657600" algn="l" defTabSz="914400" rtl="0" eaLnBrk="1" latinLnBrk="0" hangingPunct="1">
+      <a:defRPr sz="1200" kern="1200">
+        <a:solidFill>
+          <a:schemeClr val="tx1"/>
+        </a:solidFill>
+        <a:latin typeface="+mn-lt"/>
+        <a:ea typeface="+mn-ea"/>
+        <a:cs typeface="+mn-cs"/>
+      </a:defRPr>
+    </a:lvl9pPr>
+  </p:notesStyle>
+</p:notesMaster>
+</file>
+
+<file path=ppt/notesSlides/notesSlide1.xml><?xml version="1.0" encoding="utf-8"?>
+<p:notes xmlns:a="http://schemas.openxmlformats.org/drawingml/2006/main" xmlns:r="http://schemas.openxmlformats.org/officeDocument/2006/relationships" xmlns:p="http://schemas.openxmlformats.org/presentationml/2006/main">
+  <p:cSld>
+    <p:spTree>
+      <p:nvGrpSpPr>
+        <p:cNvPr id="1" name=""/>
+        <p:cNvGrpSpPr/>
+        <p:nvPr/>
+      </p:nvGrpSpPr>
+      <p:grpSpPr>
+        <a:xfrm>
+          <a:off x="0" y="0"/>
+          <a:ext cx="0" cy="0"/>
+          <a:chOff x="0" y="0"/>
+          <a:chExt cx="0" cy="0"/>
+        </a:xfrm>
+      </p:grpSpPr>
+      <p:sp>
+        <p:nvSpPr>
+          <p:cNvPr id="2" name="Slide Image Placeholder 1"/>
+          <p:cNvSpPr>
+            <a:spLocks noGrp="1" noRot="1" noChangeAspect="1"/>
+          </p:cNvSpPr>
+          <p:nvPr>
+            <p:ph type="sldImg"/>
+          </p:nvPr>
+        </p:nvSpPr>
+        <p:spPr/>
+      </p:sp>
+      <p:sp>
+        <p:nvSpPr>
+          <p:cNvPr id="3" name="Notes Placeholder 2"/>
+          <p:cNvSpPr>
+            <a:spLocks noGrp="1"/>
+          </p:cNvSpPr>
+          <p:nvPr>
+            <p:ph type="body" idx="1"/>
+          </p:nvPr>
+        </p:nvSpPr>
+        <p:spPr/>
+        <p:txBody>
+          <a:bodyPr/>
+          <a:lstStyle/>
+          <a:p>
+            <a:endParaRPr lang="en-US" dirty="0"/>
+          </a:p>
+        </p:txBody>
+      </p:sp>
+      <p:sp>
+        <p:nvSpPr>
+          <p:cNvPr id="4" name="Slide Number Placeholder 3"/>
+          <p:cNvSpPr>
+            <a:spLocks noGrp="1"/>
+          </p:cNvSpPr>
+          <p:nvPr>
+            <p:ph type="sldNum" sz="quarter" idx="10"/>
+          </p:nvPr>
+        </p:nvSpPr>
+        <p:spPr/>
+        <p:txBody>
+          <a:bodyPr/>
+          <a:lstStyle/>
+          <a:p>
+            <a:fld id="{762C5060-B157-4FD7-B73C-E89D7819CCFA}" type="slidenum">
+              <a:rPr lang="en-US" smtClean="0"/>
+              <a:t>1</a:t>
+            </a:fld>
+            <a:endParaRPr lang="en-US"/>
+          </a:p>
+        </p:txBody>
+      </p:sp>
+    </p:spTree>
+    <p:extLst>
+      <p:ext uri="{BB962C8B-B14F-4D97-AF65-F5344CB8AC3E}">
+        <p14:creationId xmlns:p14="http://schemas.microsoft.com/office/powerpoint/2010/main" val="2805203789"/>
+      </p:ext>
+    </p:extLst>
+  </p:cSld>
+  <p:clrMapOvr>
+    <a:masterClrMapping/>
+  </p:clrMapOvr>
+</p:notes>
 </file>
 
 <file path=ppt/slideLayouts/slideLayout1.xml><?xml version="1.0" encoding="utf-8"?>
@@ -4939,7 +5376,7 @@
         </p:nvSpPr>
         <p:spPr>
           <a:xfrm>
-            <a:off x="917027" y="17352263"/>
+            <a:off x="925047" y="13455950"/>
             <a:ext cx="10893973" cy="1225868"/>
           </a:xfrm>
           <a:prstGeom prst="roundRect">
@@ -5000,7 +5437,11 @@
           </a:lstStyle>
           <a:p>
             <a:r>
-              <a:rPr lang="en-US" sz="6600" b="1" cap="small" dirty="0"/>
+              <a:rPr lang="en-US" sz="6600" b="1" cap="small" dirty="0" smtClean="0"/>
+              <a:t>Experiments and </a:t>
+            </a:r>
+            <a:r>
+              <a:rPr lang="en-US" sz="6600" b="1" cap="small" dirty="0" smtClean="0"/>
               <a:t>Results</a:t>
             </a:r>
             <a:endParaRPr lang="en-US" b="1" cap="small" dirty="0"/>
@@ -5015,7 +5456,7 @@
         </p:nvSpPr>
         <p:spPr>
           <a:xfrm>
-            <a:off x="24920026" y="17352263"/>
+            <a:off x="24924097" y="18612088"/>
             <a:ext cx="10890504" cy="1225868"/>
           </a:xfrm>
           <a:prstGeom prst="roundRect">
@@ -5054,7 +5495,7 @@
           <p:nvPr/>
         </p:nvPicPr>
         <p:blipFill>
-          <a:blip r:embed="rId2">
+          <a:blip r:embed="rId3">
             <a:extLst>
               <a:ext uri="{28A0092B-C50C-407E-A947-70E740481C1C}">
                 <a14:useLocalDpi xmlns:a14="http://schemas.microsoft.com/office/drawing/2010/main" val="0"/>
@@ -5294,16 +5735,10 @@
               <a:t>allows </a:t>
             </a:r>
             <a:r>
-              <a:rPr lang="en-US" sz="3600" dirty="0" err="1" smtClean="0">
-                <a:latin typeface="Calibri" panose="020F0502020204030204" pitchFamily="34" charset="0"/>
-              </a:rPr>
-              <a:t>gitto</a:t>
-            </a:r>
-            <a:r>
               <a:rPr lang="en-US" sz="3600" dirty="0" smtClean="0">
                 <a:latin typeface="Calibri" panose="020F0502020204030204" pitchFamily="34" charset="0"/>
               </a:rPr>
-              <a:t> </a:t>
+              <a:t>it to </a:t>
             </a:r>
             <a:r>
               <a:rPr lang="en-US" sz="3600" dirty="0">
@@ -5338,16 +5773,127 @@
           </a:p>
         </p:txBody>
       </p:sp>
-      <p:sp>
-        <p:nvSpPr>
-          <p:cNvPr id="13" name="TextBox 12"/>
+      <mc:AlternateContent xmlns:mc="http://schemas.openxmlformats.org/markup-compatibility/2006">
+        <mc:Choice xmlns:a14="http://schemas.microsoft.com/office/drawing/2010/main" Requires="a14">
+          <p:sp>
+            <p:nvSpPr>
+              <p:cNvPr id="13" name="TextBox 12"/>
+              <p:cNvSpPr txBox="1"/>
+              <p:nvPr/>
+            </p:nvSpPr>
+            <p:spPr>
+              <a:xfrm>
+                <a:off x="24848122" y="6375982"/>
+                <a:ext cx="10893974" cy="3473291"/>
+              </a:xfrm>
+              <a:prstGeom prst="roundRect">
+                <a:avLst/>
+              </a:prstGeom>
+              <a:solidFill>
+                <a:srgbClr val="D3CBB6">
+                  <a:alpha val="89804"/>
+                </a:srgbClr>
+              </a:solidFill>
+            </p:spPr>
+            <p:txBody>
+              <a:bodyPr wrap="square" lIns="274320" tIns="182880" rIns="274320" bIns="182880" rtlCol="0">
+                <a:spAutoFit/>
+              </a:bodyPr>
+              <a:lstStyle>
+                <a:defPPr>
+                  <a:defRPr lang="en-US"/>
+                </a:defPPr>
+                <a:lvl1pPr algn="just">
+                  <a:defRPr sz="3600">
+                    <a:latin typeface="Calibri" panose="020F0502020204030204" pitchFamily="34" charset="0"/>
+                  </a:defRPr>
+                </a:lvl1pPr>
+              </a:lstStyle>
+              <a:p>
+                <a:r>
+                  <a:rPr lang="en-US" dirty="0" smtClean="0"/>
+                  <a:t>We performed some preliminary experiments on the Amazon’s Elastic Cloud Compute.</a:t>
+                </a:r>
+              </a:p>
+              <a:p>
+                <a:r>
+                  <a:rPr lang="en-US" dirty="0"/>
+                  <a:t>Our initial test was a Monte Carlo approximation of </a:t>
+                </a:r>
+                <a14:m>
+                  <m:oMath xmlns:m="http://schemas.openxmlformats.org/officeDocument/2006/math">
+                    <m:r>
+                      <a:rPr lang="en-US" i="1" smtClean="0">
+                        <a:latin typeface="Cambria Math" panose="02040503050406030204" pitchFamily="18" charset="0"/>
+                        <a:ea typeface="Cambria Math" panose="02040503050406030204" pitchFamily="18" charset="0"/>
+                      </a:rPr>
+                      <m:t>𝜋</m:t>
+                    </m:r>
+                  </m:oMath>
+                </a14:m>
+                <a:r>
+                  <a:rPr lang="en-US" dirty="0" smtClean="0"/>
+                  <a:t>.</a:t>
+                </a:r>
+              </a:p>
+              <a:p>
+                <a:r>
+                  <a:rPr lang="en-US" dirty="0" smtClean="0"/>
+                  <a:t>We varied the network size, the problem size, and  churn rate.</a:t>
+                </a:r>
+              </a:p>
+            </p:txBody>
+          </p:sp>
+        </mc:Choice>
+        <mc:Fallback>
+          <p:sp>
+            <p:nvSpPr>
+              <p:cNvPr id="13" name="TextBox 12"/>
+              <p:cNvSpPr txBox="1">
+                <a:spLocks noRot="1" noChangeAspect="1" noMove="1" noResize="1" noEditPoints="1" noAdjustHandles="1" noChangeArrowheads="1" noChangeShapeType="1" noTextEdit="1"/>
+              </p:cNvSpPr>
+              <p:nvPr/>
+            </p:nvSpPr>
+            <p:spPr>
+              <a:xfrm>
+                <a:off x="24848122" y="6375982"/>
+                <a:ext cx="10893974" cy="3473291"/>
+              </a:xfrm>
+              <a:prstGeom prst="roundRect">
+                <a:avLst/>
+              </a:prstGeom>
+              <a:blipFill rotWithShape="0">
+                <a:blip r:embed="rId4"/>
+                <a:stretch>
+                  <a:fillRect/>
+                </a:stretch>
+              </a:blipFill>
+            </p:spPr>
+            <p:txBody>
+              <a:bodyPr/>
+              <a:lstStyle/>
+              <a:p>
+                <a:r>
+                  <a:rPr lang="en-US">
+                    <a:noFill/>
+                  </a:rPr>
+                  <a:t> </a:t>
+                </a:r>
+              </a:p>
+            </p:txBody>
+          </p:sp>
+        </mc:Fallback>
+      </mc:AlternateContent>
+      <p:sp>
+        <p:nvSpPr>
+          <p:cNvPr id="14" name="TextBox 13"/>
           <p:cNvSpPr txBox="1"/>
           <p:nvPr/>
         </p:nvSpPr>
         <p:spPr>
           <a:xfrm>
-            <a:off x="24920026" y="6416993"/>
-            <a:ext cx="10893974" cy="1021556"/>
+            <a:off x="24843450" y="20164909"/>
+            <a:ext cx="10898646" cy="4086225"/>
           </a:xfrm>
           <a:prstGeom prst="roundRect">
             <a:avLst/>
@@ -5374,51 +5920,46 @@
           </a:lstStyle>
           <a:p>
             <a:r>
+              <a:rPr lang="en-US" dirty="0" smtClean="0"/>
+              <a:t>Our experiments established that </a:t>
+            </a:r>
+            <a:r>
+              <a:rPr lang="en-US" dirty="0" err="1" smtClean="0"/>
+              <a:t>ChordReduce</a:t>
+            </a:r>
+            <a:r>
+              <a:rPr lang="en-US" dirty="0" smtClean="0"/>
+              <a:t> operates under high rates of churn and that we gain the desired speedup on sufficiently </a:t>
+            </a:r>
+            <a:r>
               <a:rPr lang="en-US" dirty="0"/>
-              <a:t>Motivation</a:t>
-            </a:r>
-          </a:p>
-        </p:txBody>
-      </p:sp>
-      <p:sp>
-        <p:nvSpPr>
-          <p:cNvPr id="14" name="TextBox 13"/>
-          <p:cNvSpPr txBox="1"/>
-          <p:nvPr/>
-        </p:nvSpPr>
-        <p:spPr>
-          <a:xfrm>
-            <a:off x="24920026" y="19044747"/>
-            <a:ext cx="10898646" cy="1021556"/>
-          </a:xfrm>
-          <a:prstGeom prst="roundRect">
-            <a:avLst/>
-          </a:prstGeom>
-          <a:solidFill>
-            <a:srgbClr val="D3CBB6">
-              <a:alpha val="89804"/>
-            </a:srgbClr>
-          </a:solidFill>
-        </p:spPr>
-        <p:txBody>
-          <a:bodyPr wrap="square" lIns="274320" tIns="182880" rIns="274320" bIns="182880" rtlCol="0">
-            <a:spAutoFit/>
-          </a:bodyPr>
-          <a:lstStyle>
-            <a:defPPr>
-              <a:defRPr lang="en-US"/>
-            </a:defPPr>
-            <a:lvl1pPr algn="just">
-              <a:defRPr sz="3600">
-                <a:latin typeface="Calibri" panose="020F0502020204030204" pitchFamily="34" charset="0"/>
-              </a:defRPr>
-            </a:lvl1pPr>
-          </a:lstStyle>
-          <a:p>
+              <a:t>large problems. This makes </a:t>
+            </a:r>
+            <a:r>
+              <a:rPr lang="en-US" dirty="0" err="1"/>
+              <a:t>ChordReduce</a:t>
+            </a:r>
             <a:r>
               <a:rPr lang="en-US" dirty="0"/>
-              <a:t>Motivation</a:t>
-            </a:r>
+              <a:t> an excellent platform for distributed </a:t>
+            </a:r>
+            <a:r>
+              <a:rPr lang="en-US" dirty="0" smtClean="0"/>
+              <a:t>and concurrent </a:t>
+            </a:r>
+            <a:r>
+              <a:rPr lang="en-US" dirty="0"/>
+              <a:t>programming in cloud and loosely </a:t>
+            </a:r>
+            <a:r>
+              <a:rPr lang="en-US" dirty="0" smtClean="0"/>
+              <a:t>coupled environments</a:t>
+            </a:r>
+            <a:r>
+              <a:rPr lang="en-US" dirty="0"/>
+              <a:t>.</a:t>
+            </a:r>
+            <a:endParaRPr lang="en-US" dirty="0"/>
           </a:p>
         </p:txBody>
       </p:sp>
@@ -5469,7 +6010,7 @@
           <p:nvPr/>
         </p:nvPicPr>
         <p:blipFill>
-          <a:blip r:embed="rId3">
+          <a:blip r:embed="rId5">
             <a:extLst>
               <a:ext uri="{28A0092B-C50C-407E-A947-70E740481C1C}">
                 <a14:useLocalDpi xmlns:a14="http://schemas.microsoft.com/office/drawing/2010/main" val="0"/>
@@ -5492,67 +6033,7 @@
       </p:pic>
       <p:pic>
         <p:nvPicPr>
-          <p:cNvPr id="18" name="Picture 17"/>
-          <p:cNvPicPr>
-            <a:picLocks noChangeAspect="1"/>
-          </p:cNvPicPr>
-          <p:nvPr/>
-        </p:nvPicPr>
-        <p:blipFill>
-          <a:blip r:embed="rId4">
-            <a:extLst>
-              <a:ext uri="{28A0092B-C50C-407E-A947-70E740481C1C}">
-                <a14:useLocalDpi xmlns:a14="http://schemas.microsoft.com/office/drawing/2010/main" val="0"/>
-              </a:ext>
-            </a:extLst>
-          </a:blip>
-          <a:stretch>
-            <a:fillRect/>
-          </a:stretch>
-        </p:blipFill>
-        <p:spPr>
-          <a:xfrm>
-            <a:off x="14906624" y="14485980"/>
-            <a:ext cx="6219825" cy="6448425"/>
-          </a:xfrm>
-          <a:prstGeom prst="rect">
-            <a:avLst/>
-          </a:prstGeom>
-        </p:spPr>
-      </p:pic>
-      <p:pic>
-        <p:nvPicPr>
-          <p:cNvPr id="19" name="Picture 18"/>
-          <p:cNvPicPr>
-            <a:picLocks noChangeAspect="1"/>
-          </p:cNvPicPr>
-          <p:nvPr/>
-        </p:nvPicPr>
-        <p:blipFill>
-          <a:blip r:embed="rId5">
-            <a:extLst>
-              <a:ext uri="{28A0092B-C50C-407E-A947-70E740481C1C}">
-                <a14:useLocalDpi xmlns:a14="http://schemas.microsoft.com/office/drawing/2010/main" val="0"/>
-              </a:ext>
-            </a:extLst>
-          </a:blip>
-          <a:stretch>
-            <a:fillRect/>
-          </a:stretch>
-        </p:blipFill>
-        <p:spPr>
-          <a:xfrm>
-            <a:off x="11810999" y="20955000"/>
-            <a:ext cx="6191250" cy="6372225"/>
-          </a:xfrm>
-          <a:prstGeom prst="rect">
-            <a:avLst/>
-          </a:prstGeom>
-        </p:spPr>
-      </p:pic>
-      <p:pic>
-        <p:nvPicPr>
-          <p:cNvPr id="21" name="Picture 20"/>
+          <p:cNvPr id="3" name="Picture 2"/>
           <p:cNvPicPr>
             <a:picLocks noChangeAspect="1"/>
           </p:cNvPicPr>
@@ -5572,37 +6053,7 @@
         </p:blipFill>
         <p:spPr>
           <a:xfrm>
-            <a:off x="18020655" y="20955000"/>
-            <a:ext cx="6286500" cy="6496050"/>
-          </a:xfrm>
-          <a:prstGeom prst="rect">
-            <a:avLst/>
-          </a:prstGeom>
-        </p:spPr>
-      </p:pic>
-      <p:pic>
-        <p:nvPicPr>
-          <p:cNvPr id="3" name="Picture 2"/>
-          <p:cNvPicPr>
-            <a:picLocks noChangeAspect="1"/>
-          </p:cNvPicPr>
-          <p:nvPr/>
-        </p:nvPicPr>
-        <p:blipFill>
-          <a:blip r:embed="rId7">
-            <a:extLst>
-              <a:ext uri="{28A0092B-C50C-407E-A947-70E740481C1C}">
-                <a14:useLocalDpi xmlns:a14="http://schemas.microsoft.com/office/drawing/2010/main" val="0"/>
-              </a:ext>
-            </a:extLst>
-          </a:blip>
-          <a:stretch>
-            <a:fillRect/>
-          </a:stretch>
-        </p:blipFill>
-        <p:spPr>
-          <a:xfrm>
-            <a:off x="25098606" y="7618076"/>
+            <a:off x="24993044" y="9941902"/>
             <a:ext cx="7452375" cy="5623571"/>
           </a:xfrm>
           <a:prstGeom prst="rect">
@@ -5610,87 +6061,403 @@
           </a:prstGeom>
         </p:spPr>
       </p:pic>
-      <p:sp>
-        <p:nvSpPr>
-          <p:cNvPr id="20" name="TextBox 19"/>
-          <p:cNvSpPr txBox="1"/>
-          <p:nvPr/>
-        </p:nvSpPr>
-        <p:spPr>
-          <a:xfrm>
-            <a:off x="898620" y="19044747"/>
-            <a:ext cx="10893973" cy="3169682"/>
-          </a:xfrm>
-          <a:prstGeom prst="roundRect">
-            <a:avLst>
-              <a:gd name="adj" fmla="val 2452"/>
-            </a:avLst>
-          </a:prstGeom>
-          <a:solidFill>
-            <a:srgbClr val="D3CBB6">
-              <a:alpha val="89804"/>
-            </a:srgbClr>
-          </a:solidFill>
-        </p:spPr>
-        <p:txBody>
-          <a:bodyPr wrap="square" lIns="274320" tIns="182880" rIns="274320" bIns="182880" rtlCol="0">
-            <a:spAutoFit/>
-          </a:bodyPr>
-          <a:lstStyle>
-            <a:defPPr>
-              <a:defRPr lang="en-US"/>
-            </a:defPPr>
-          </a:lstStyle>
-          <a:p>
-            <a:pPr algn="just"/>
-            <a:r>
-              <a:rPr lang="en-US" sz="3600" dirty="0" err="1" smtClean="0">
-                <a:latin typeface="Calibri" panose="020F0502020204030204" pitchFamily="34" charset="0"/>
-              </a:rPr>
-              <a:t>ChordReduce</a:t>
-            </a:r>
-            <a:r>
-              <a:rPr lang="en-US" sz="3600" dirty="0" smtClean="0">
-                <a:latin typeface="Calibri" panose="020F0502020204030204" pitchFamily="34" charset="0"/>
-              </a:rPr>
-              <a:t> has three layers:  the Chord lookup and overlay, the file system layer, and the </a:t>
-            </a:r>
-            <a:r>
-              <a:rPr lang="en-US" sz="3600" dirty="0" err="1" smtClean="0">
-                <a:latin typeface="Calibri" panose="020F0502020204030204" pitchFamily="34" charset="0"/>
-              </a:rPr>
-              <a:t>MapReduce</a:t>
-            </a:r>
-            <a:r>
-              <a:rPr lang="en-US" sz="3600" dirty="0" smtClean="0">
-                <a:latin typeface="Calibri" panose="020F0502020204030204" pitchFamily="34" charset="0"/>
-              </a:rPr>
-              <a:t> processing layer.</a:t>
-            </a:r>
-          </a:p>
-          <a:p>
-            <a:pPr algn="just"/>
-            <a:endParaRPr lang="en-US" sz="3600" dirty="0" smtClean="0">
-              <a:latin typeface="Calibri" panose="020F0502020204030204" pitchFamily="34" charset="0"/>
-            </a:endParaRPr>
-          </a:p>
-          <a:p>
-            <a:pPr marL="571500" indent="-571500" algn="just">
-              <a:buFont typeface="Arial" panose="020B0604020202020204" pitchFamily="34" charset="0"/>
-              <a:buChar char="•"/>
-            </a:pPr>
-            <a:r>
-              <a:rPr lang="en-US" sz="3600" dirty="0" smtClean="0">
-                <a:latin typeface="Calibri" panose="020F0502020204030204" pitchFamily="34" charset="0"/>
-              </a:rPr>
-              <a:t>Chord handles is </a:t>
-            </a:r>
-            <a:endParaRPr lang="en-US" sz="3600" dirty="0">
-              <a:latin typeface="Calibri" panose="020F0502020204030204" pitchFamily="34" charset="0"/>
-            </a:endParaRPr>
-          </a:p>
-        </p:txBody>
-      </p:sp>
+      <mc:AlternateContent xmlns:mc="http://schemas.openxmlformats.org/markup-compatibility/2006">
+        <mc:Choice xmlns:a14="http://schemas.microsoft.com/office/drawing/2010/main" Requires="a14">
+          <p:sp>
+            <p:nvSpPr>
+              <p:cNvPr id="20" name="TextBox 19"/>
+              <p:cNvSpPr txBox="1"/>
+              <p:nvPr/>
+            </p:nvSpPr>
+            <p:spPr>
+              <a:xfrm>
+                <a:off x="925047" y="14994576"/>
+                <a:ext cx="10893973" cy="13362384"/>
+              </a:xfrm>
+              <a:prstGeom prst="roundRect">
+                <a:avLst>
+                  <a:gd name="adj" fmla="val 2452"/>
+                </a:avLst>
+              </a:prstGeom>
+              <a:solidFill>
+                <a:srgbClr val="D3CBB6">
+                  <a:alpha val="89804"/>
+                </a:srgbClr>
+              </a:solidFill>
+            </p:spPr>
+            <p:txBody>
+              <a:bodyPr wrap="square" lIns="274320" tIns="182880" rIns="274320" bIns="182880" rtlCol="0">
+                <a:spAutoFit/>
+              </a:bodyPr>
+              <a:lstStyle>
+                <a:defPPr>
+                  <a:defRPr lang="en-US"/>
+                </a:defPPr>
+              </a:lstStyle>
+              <a:p>
+                <a:pPr algn="just"/>
+                <a:r>
+                  <a:rPr lang="en-US" sz="3600" dirty="0" smtClean="0">
+                    <a:latin typeface="Calibri" panose="020F0502020204030204" pitchFamily="34" charset="0"/>
+                  </a:rPr>
+                  <a:t>ChordReduce</a:t>
+                </a:r>
+                <a:r>
+                  <a:rPr lang="en-US" sz="3600" dirty="0" smtClean="0">
+                    <a:latin typeface="Calibri" panose="020F0502020204030204" pitchFamily="34" charset="0"/>
+                  </a:rPr>
+                  <a:t> has three layers:  the Chord lookup and overlay, the file system layer, and the </a:t>
+                </a:r>
+                <a:r>
+                  <a:rPr lang="en-US" sz="3600" dirty="0" err="1" smtClean="0">
+                    <a:latin typeface="Calibri" panose="020F0502020204030204" pitchFamily="34" charset="0"/>
+                  </a:rPr>
+                  <a:t>MapReduce</a:t>
+                </a:r>
+                <a:r>
+                  <a:rPr lang="en-US" sz="3600" dirty="0" smtClean="0">
+                    <a:latin typeface="Calibri" panose="020F0502020204030204" pitchFamily="34" charset="0"/>
+                  </a:rPr>
+                  <a:t> processing layer</a:t>
+                </a:r>
+                <a:r>
+                  <a:rPr lang="en-US" sz="3600" dirty="0" smtClean="0">
+                    <a:latin typeface="Calibri" panose="020F0502020204030204" pitchFamily="34" charset="0"/>
+                  </a:rPr>
+                  <a:t>.</a:t>
+                </a:r>
+              </a:p>
+              <a:p>
+                <a:pPr marL="571500" indent="-571500" algn="just">
+                  <a:buFont typeface="Arial" panose="020B0604020202020204" pitchFamily="34" charset="0"/>
+                  <a:buChar char="•"/>
+                </a:pPr>
+                <a:r>
+                  <a:rPr lang="en-US" sz="2800" dirty="0" smtClean="0">
+                    <a:latin typeface="Calibri" panose="020F0502020204030204" pitchFamily="34" charset="0"/>
+                  </a:rPr>
+                  <a:t>Chord manages </a:t>
+                </a:r>
+                <a:r>
+                  <a:rPr lang="en-US" sz="2800" dirty="0" smtClean="0">
+                    <a:latin typeface="Calibri" panose="020F0502020204030204" pitchFamily="34" charset="0"/>
+                  </a:rPr>
+                  <a:t>lookup and routing in the network.</a:t>
+                </a:r>
+              </a:p>
+              <a:p>
+                <a:pPr marL="571500" indent="-571500" algn="just">
+                  <a:buFont typeface="Arial" panose="020B0604020202020204" pitchFamily="34" charset="0"/>
+                  <a:buChar char="•"/>
+                </a:pPr>
+                <a:r>
+                  <a:rPr lang="en-US" sz="2800" dirty="0" smtClean="0">
+                    <a:latin typeface="Calibri" panose="020F0502020204030204" pitchFamily="34" charset="0"/>
+                  </a:rPr>
+                  <a:t>Nodes and files have an </a:t>
+                </a:r>
+                <a:r>
+                  <a:rPr lang="en-US" sz="2800" i="1" dirty="0" smtClean="0">
+                    <a:latin typeface="Calibri" panose="020F0502020204030204" pitchFamily="34" charset="0"/>
+                  </a:rPr>
+                  <a:t>m</a:t>
+                </a:r>
+                <a:r>
+                  <a:rPr lang="en-US" sz="2800" dirty="0" smtClean="0">
+                    <a:latin typeface="Calibri" panose="020F0502020204030204" pitchFamily="34" charset="0"/>
+                  </a:rPr>
+                  <a:t>-bit hash key.  </a:t>
+                </a:r>
+              </a:p>
+              <a:p>
+                <a:pPr marL="571500" indent="-571500" algn="just">
+                  <a:buFont typeface="Arial" panose="020B0604020202020204" pitchFamily="34" charset="0"/>
+                  <a:buChar char="•"/>
+                </a:pPr>
+                <a:r>
+                  <a:rPr lang="en-US" sz="2800" dirty="0" smtClean="0">
+                    <a:latin typeface="Calibri" panose="020F0502020204030204" pitchFamily="34" charset="0"/>
+                  </a:rPr>
+                  <a:t>Nodes are arranged in a ring overlay.</a:t>
+                </a:r>
+              </a:p>
+              <a:p>
+                <a:pPr marL="571500" indent="-571500" algn="just">
+                  <a:buFont typeface="Arial" panose="020B0604020202020204" pitchFamily="34" charset="0"/>
+                  <a:buChar char="•"/>
+                </a:pPr>
+                <a:r>
+                  <a:rPr lang="en-US" sz="2800" dirty="0" smtClean="0">
+                    <a:latin typeface="Calibri" panose="020F0502020204030204" pitchFamily="34" charset="0"/>
+                  </a:rPr>
+                  <a:t>Nodes know their predecessor and successor, and are responsible for data with keys between their predecessor and themselves.</a:t>
+                </a:r>
+              </a:p>
+              <a:p>
+                <a:pPr marL="571500" indent="-571500" algn="just">
+                  <a:buFont typeface="Arial" panose="020B0604020202020204" pitchFamily="34" charset="0"/>
+                  <a:buChar char="•"/>
+                </a:pPr>
+                <a:r>
+                  <a:rPr lang="en-US" sz="2800" dirty="0" smtClean="0">
+                    <a:latin typeface="Calibri" panose="020F0502020204030204" pitchFamily="34" charset="0"/>
+                  </a:rPr>
+                  <a:t>To speed routing, nodes maintain a table of </a:t>
+                </a:r>
+                <a:r>
+                  <a:rPr lang="en-US" sz="2800" i="1" dirty="0" smtClean="0">
+                    <a:latin typeface="Calibri" panose="020F0502020204030204" pitchFamily="34" charset="0"/>
+                  </a:rPr>
+                  <a:t>m</a:t>
+                </a:r>
+                <a:r>
+                  <a:rPr lang="en-US" sz="2800" dirty="0" smtClean="0">
+                    <a:latin typeface="Calibri" panose="020F0502020204030204" pitchFamily="34" charset="0"/>
+                  </a:rPr>
+                  <a:t> shortcuts, called fingers, allowing for </a:t>
+                </a:r>
+                <a14:m>
+                  <m:oMath xmlns:m="http://schemas.openxmlformats.org/officeDocument/2006/math">
+                    <m:func>
+                      <m:funcPr>
+                        <m:ctrlPr>
+                          <a:rPr lang="en-US" sz="2800" i="1" smtClean="0">
+                            <a:latin typeface="Cambria Math" panose="02040503050406030204" pitchFamily="18" charset="0"/>
+                          </a:rPr>
+                        </m:ctrlPr>
+                      </m:funcPr>
+                      <m:fName>
+                        <m:r>
+                          <m:rPr>
+                            <m:sty m:val="p"/>
+                          </m:rPr>
+                          <a:rPr lang="en-US" sz="2800" i="0" smtClean="0">
+                            <a:latin typeface="Cambria Math" panose="02040503050406030204" pitchFamily="18" charset="0"/>
+                          </a:rPr>
+                          <m:t>log</m:t>
+                        </m:r>
+                      </m:fName>
+                      <m:e>
+                        <m:r>
+                          <a:rPr lang="en-US" sz="2800" b="0" i="1" smtClean="0">
+                            <a:latin typeface="Cambria Math" panose="02040503050406030204" pitchFamily="18" charset="0"/>
+                          </a:rPr>
+                          <m:t>𝑁</m:t>
+                        </m:r>
+                      </m:e>
+                    </m:func>
+                    <m:r>
+                      <a:rPr lang="en-US" sz="2800" b="0" i="1" smtClean="0">
+                        <a:latin typeface="Cambria Math" panose="02040503050406030204" pitchFamily="18" charset="0"/>
+                      </a:rPr>
+                      <m:t> </m:t>
+                    </m:r>
+                  </m:oMath>
+                </a14:m>
+                <a:r>
+                  <a:rPr lang="en-US" sz="2800" dirty="0" smtClean="0">
+                    <a:latin typeface="Calibri" panose="020F0502020204030204" pitchFamily="34" charset="0"/>
+                  </a:rPr>
+                  <a:t>time lookup.</a:t>
+                </a:r>
+              </a:p>
+              <a:p>
+                <a:pPr marL="571500" indent="-571500" algn="just">
+                  <a:buFont typeface="Arial" panose="020B0604020202020204" pitchFamily="34" charset="0"/>
+                  <a:buChar char="•"/>
+                </a:pPr>
+                <a:r>
+                  <a:rPr lang="en-US" sz="2800" dirty="0" smtClean="0">
+                    <a:latin typeface="Calibri" panose="020F0502020204030204" pitchFamily="34" charset="0"/>
+                  </a:rPr>
+                  <a:t>If a node leaves the network, requests that would have been handled by the node are handled by the node’s direct successor. Data a node is responsible for is backed up to its </a:t>
+                </a:r>
+                <a:r>
+                  <a:rPr lang="en-US" sz="2800" i="1" dirty="0" smtClean="0">
+                    <a:latin typeface="Calibri" panose="020F0502020204030204" pitchFamily="34" charset="0"/>
+                  </a:rPr>
+                  <a:t>s</a:t>
+                </a:r>
+                <a:r>
+                  <a:rPr lang="en-US" sz="2800" dirty="0" smtClean="0">
+                    <a:latin typeface="Calibri" panose="020F0502020204030204" pitchFamily="34" charset="0"/>
+                  </a:rPr>
+                  <a:t> closest successors. </a:t>
+                </a:r>
+              </a:p>
+              <a:p>
+                <a:pPr marL="571500" indent="-571500" algn="just">
+                  <a:buFont typeface="Arial" panose="020B0604020202020204" pitchFamily="34" charset="0"/>
+                  <a:buChar char="•"/>
+                </a:pPr>
+                <a:r>
+                  <a:rPr lang="en-US" sz="2800" dirty="0" smtClean="0">
+                    <a:latin typeface="Calibri" panose="020F0502020204030204" pitchFamily="34" charset="0"/>
+                  </a:rPr>
+                  <a:t>If </a:t>
+                </a:r>
+                <a:r>
+                  <a:rPr lang="en-US" sz="2800" dirty="0">
+                    <a:latin typeface="Calibri" panose="020F0502020204030204" pitchFamily="34" charset="0"/>
+                  </a:rPr>
+                  <a:t>a node detects a new predecessor, it sends the </a:t>
+                </a:r>
+                <a:r>
+                  <a:rPr lang="en-US" sz="2800" dirty="0" smtClean="0">
+                    <a:latin typeface="Calibri" panose="020F0502020204030204" pitchFamily="34" charset="0"/>
+                  </a:rPr>
+                  <a:t>predecessor all </a:t>
+                </a:r>
+                <a:r>
+                  <a:rPr lang="en-US" sz="2800" dirty="0">
+                    <a:latin typeface="Calibri" panose="020F0502020204030204" pitchFamily="34" charset="0"/>
+                  </a:rPr>
+                  <a:t>the data it should be responsible for</a:t>
+                </a:r>
+                <a:r>
+                  <a:rPr lang="en-US" sz="2800" dirty="0" smtClean="0">
+                    <a:latin typeface="Calibri" panose="020F0502020204030204" pitchFamily="34" charset="0"/>
+                  </a:rPr>
+                  <a:t>.</a:t>
+                </a:r>
+              </a:p>
+              <a:p>
+                <a:pPr marL="571500" indent="-571500" algn="just">
+                  <a:buFont typeface="Arial" panose="020B0604020202020204" pitchFamily="34" charset="0"/>
+                  <a:buChar char="•"/>
+                </a:pPr>
+                <a:r>
+                  <a:rPr lang="en-US" sz="2800" dirty="0" smtClean="0">
+                    <a:latin typeface="Calibri" panose="020F0502020204030204" pitchFamily="34" charset="0"/>
+                  </a:rPr>
+                  <a:t>These features make Chord (and </a:t>
+                </a:r>
+                <a:r>
+                  <a:rPr lang="en-US" sz="2800" dirty="0" err="1" smtClean="0">
+                    <a:latin typeface="Calibri" panose="020F0502020204030204" pitchFamily="34" charset="0"/>
+                  </a:rPr>
+                  <a:t>ChordReduce</a:t>
+                </a:r>
+                <a:r>
+                  <a:rPr lang="en-US" sz="2800" dirty="0" smtClean="0">
+                    <a:latin typeface="Calibri" panose="020F0502020204030204" pitchFamily="34" charset="0"/>
+                  </a:rPr>
+                  <a:t>) largely immune to churn.</a:t>
+                </a:r>
+              </a:p>
+              <a:p>
+                <a:pPr marL="571500" indent="-571500" algn="just">
+                  <a:buFont typeface="Arial" panose="020B0604020202020204" pitchFamily="34" charset="0"/>
+                  <a:buChar char="•"/>
+                </a:pPr>
+                <a:r>
+                  <a:rPr lang="en-US" sz="2800" dirty="0" smtClean="0">
+                    <a:latin typeface="Calibri" panose="020F0502020204030204" pitchFamily="34" charset="0"/>
+                  </a:rPr>
+                  <a:t>The Cooperative File System (CFS), handles data storage and retrieval.</a:t>
+                </a:r>
+              </a:p>
+              <a:p>
+                <a:pPr marL="571500" indent="-571500" algn="just">
+                  <a:buFont typeface="Arial" panose="020B0604020202020204" pitchFamily="34" charset="0"/>
+                  <a:buChar char="•"/>
+                </a:pPr>
+                <a:r>
+                  <a:rPr lang="en-US" sz="2800" dirty="0" smtClean="0">
+                    <a:latin typeface="Calibri" panose="020F0502020204030204" pitchFamily="34" charset="0"/>
+                  </a:rPr>
+                  <a:t>Rather than storing the whole file in  a single node, nodes are split into blocks with their own keys and stored in different nodes.</a:t>
+                </a:r>
+              </a:p>
+              <a:p>
+                <a:pPr marL="571500" indent="-571500" algn="just">
+                  <a:buFont typeface="Arial" panose="020B0604020202020204" pitchFamily="34" charset="0"/>
+                  <a:buChar char="•"/>
+                </a:pPr>
+                <a:r>
+                  <a:rPr lang="en-US" sz="2800" dirty="0" smtClean="0">
+                    <a:latin typeface="Calibri" panose="020F0502020204030204" pitchFamily="34" charset="0"/>
+                  </a:rPr>
+                  <a:t>To retrieve a file, the requester gets the </a:t>
+                </a:r>
+                <a:r>
+                  <a:rPr lang="en-US" sz="2800" dirty="0" err="1" smtClean="0">
+                    <a:latin typeface="Calibri" panose="020F0502020204030204" pitchFamily="34" charset="0"/>
+                  </a:rPr>
+                  <a:t>keyfile</a:t>
+                </a:r>
+                <a:r>
+                  <a:rPr lang="en-US" sz="2800" dirty="0" smtClean="0">
+                    <a:latin typeface="Calibri" panose="020F0502020204030204" pitchFamily="34" charset="0"/>
+                  </a:rPr>
+                  <a:t>, the list of keys for each block, stored in the node where the whole file would normally be found.</a:t>
+                </a:r>
+              </a:p>
+              <a:p>
+                <a:pPr marL="571500" indent="-571500" algn="just">
+                  <a:buFont typeface="Arial" panose="020B0604020202020204" pitchFamily="34" charset="0"/>
+                  <a:buChar char="•"/>
+                </a:pPr>
+                <a:r>
+                  <a:rPr lang="en-US" sz="2800" dirty="0" smtClean="0">
+                    <a:latin typeface="Calibri" panose="020F0502020204030204" pitchFamily="34" charset="0"/>
+                  </a:rPr>
+                  <a:t>Maps and Reduces are backed up in the same manner as data.  Successors takeover and perform the task if a node fails.  New predecessors are assigned tasks if they join the network during execution, </a:t>
+                </a:r>
+                <a:r>
+                  <a:rPr lang="en-US" sz="2800" b="1" dirty="0" smtClean="0">
+                    <a:latin typeface="Calibri" panose="020F0502020204030204" pitchFamily="34" charset="0"/>
+                  </a:rPr>
+                  <a:t>allowing for additional load-balancing during runtime.</a:t>
+                </a:r>
+                <a:endParaRPr lang="en-US" sz="2800" dirty="0" smtClean="0">
+                  <a:latin typeface="Calibri" panose="020F0502020204030204" pitchFamily="34" charset="0"/>
+                </a:endParaRPr>
+              </a:p>
+            </p:txBody>
+          </p:sp>
+        </mc:Choice>
+        <mc:Fallback>
+          <p:sp>
+            <p:nvSpPr>
+              <p:cNvPr id="20" name="TextBox 19"/>
+              <p:cNvSpPr txBox="1">
+                <a:spLocks noRot="1" noChangeAspect="1" noMove="1" noResize="1" noEditPoints="1" noAdjustHandles="1" noChangeArrowheads="1" noChangeShapeType="1" noTextEdit="1"/>
+              </p:cNvSpPr>
+              <p:nvPr/>
+            </p:nvSpPr>
+            <p:spPr>
+              <a:xfrm>
+                <a:off x="925047" y="14994576"/>
+                <a:ext cx="10893973" cy="13362384"/>
+              </a:xfrm>
+              <a:prstGeom prst="roundRect">
+                <a:avLst>
+                  <a:gd name="adj" fmla="val 2452"/>
+                </a:avLst>
+              </a:prstGeom>
+              <a:blipFill rotWithShape="0">
+                <a:blip r:embed="rId7"/>
+                <a:stretch>
+                  <a:fillRect/>
+                </a:stretch>
+              </a:blipFill>
+            </p:spPr>
+            <p:txBody>
+              <a:bodyPr/>
+              <a:lstStyle/>
+              <a:p>
+                <a:r>
+                  <a:rPr lang="en-US">
+                    <a:noFill/>
+                  </a:rPr>
+                  <a:t> </a:t>
+                </a:r>
+              </a:p>
+            </p:txBody>
+          </p:sp>
+        </mc:Fallback>
+      </mc:AlternateContent>
       <p:sp>
         <p:nvSpPr>
           <p:cNvPr id="22" name="TextBox 21"/>
@@ -5699,7 +6466,7 @@
         </p:nvSpPr>
         <p:spPr>
           <a:xfrm>
-            <a:off x="24940740" y="23389728"/>
+            <a:off x="24875849" y="24461020"/>
             <a:ext cx="10890504" cy="1225868"/>
           </a:xfrm>
           <a:prstGeom prst="roundRect">
@@ -5737,7 +6504,7 @@
         </p:nvSpPr>
         <p:spPr>
           <a:xfrm>
-            <a:off x="24915955" y="25072100"/>
+            <a:off x="24843450" y="25878146"/>
             <a:ext cx="10898646" cy="3166824"/>
           </a:xfrm>
           <a:prstGeom prst="roundRect">
@@ -6041,6 +6808,941 @@
               <a:t>2011</a:t>
             </a:r>
             <a:endParaRPr lang="en-US" sz="1800" dirty="0"/>
+          </a:p>
+        </p:txBody>
+      </p:sp>
+      <p:pic>
+        <p:nvPicPr>
+          <p:cNvPr id="8" name="Picture 7"/>
+          <p:cNvPicPr>
+            <a:picLocks noChangeAspect="1"/>
+          </p:cNvPicPr>
+          <p:nvPr/>
+        </p:nvPicPr>
+        <p:blipFill>
+          <a:blip r:embed="rId8">
+            <a:extLst>
+              <a:ext uri="{28A0092B-C50C-407E-A947-70E740481C1C}">
+                <a14:useLocalDpi xmlns:a14="http://schemas.microsoft.com/office/drawing/2010/main" val="0"/>
+              </a:ext>
+            </a:extLst>
+          </a:blip>
+          <a:stretch>
+            <a:fillRect/>
+          </a:stretch>
+        </p:blipFill>
+        <p:spPr>
+          <a:xfrm>
+            <a:off x="12215785" y="13415904"/>
+            <a:ext cx="6210300" cy="6019800"/>
+          </a:xfrm>
+          <a:prstGeom prst="rect">
+            <a:avLst/>
+          </a:prstGeom>
+        </p:spPr>
+      </p:pic>
+      <p:pic>
+        <p:nvPicPr>
+          <p:cNvPr id="9" name="Picture 8"/>
+          <p:cNvPicPr>
+            <a:picLocks noChangeAspect="1"/>
+          </p:cNvPicPr>
+          <p:nvPr/>
+        </p:nvPicPr>
+        <p:blipFill>
+          <a:blip r:embed="rId9">
+            <a:extLst>
+              <a:ext uri="{28A0092B-C50C-407E-A947-70E740481C1C}">
+                <a14:useLocalDpi xmlns:a14="http://schemas.microsoft.com/office/drawing/2010/main" val="0"/>
+              </a:ext>
+            </a:extLst>
+          </a:blip>
+          <a:stretch>
+            <a:fillRect/>
+          </a:stretch>
+        </p:blipFill>
+        <p:spPr>
+          <a:xfrm>
+            <a:off x="11963929" y="19435704"/>
+            <a:ext cx="6276975" cy="6543675"/>
+          </a:xfrm>
+          <a:prstGeom prst="rect">
+            <a:avLst/>
+          </a:prstGeom>
+        </p:spPr>
+      </p:pic>
+      <p:pic>
+        <p:nvPicPr>
+          <p:cNvPr id="10" name="Picture 9"/>
+          <p:cNvPicPr>
+            <a:picLocks noChangeAspect="1"/>
+          </p:cNvPicPr>
+          <p:nvPr/>
+        </p:nvPicPr>
+        <p:blipFill>
+          <a:blip r:embed="rId10">
+            <a:extLst>
+              <a:ext uri="{28A0092B-C50C-407E-A947-70E740481C1C}">
+                <a14:useLocalDpi xmlns:a14="http://schemas.microsoft.com/office/drawing/2010/main" val="0"/>
+              </a:ext>
+            </a:extLst>
+          </a:blip>
+          <a:stretch>
+            <a:fillRect/>
+          </a:stretch>
+        </p:blipFill>
+        <p:spPr>
+          <a:xfrm>
+            <a:off x="18121259" y="19374885"/>
+            <a:ext cx="6286500" cy="6496050"/>
+          </a:xfrm>
+          <a:prstGeom prst="rect">
+            <a:avLst/>
+          </a:prstGeom>
+        </p:spPr>
+      </p:pic>
+      <p:sp>
+        <p:nvSpPr>
+          <p:cNvPr id="24" name="TextBox 23"/>
+          <p:cNvSpPr txBox="1"/>
+          <p:nvPr/>
+        </p:nvSpPr>
+        <p:spPr>
+          <a:xfrm>
+            <a:off x="12465779" y="25947295"/>
+            <a:ext cx="5273273" cy="3268980"/>
+          </a:xfrm>
+          <a:prstGeom prst="roundRect">
+            <a:avLst/>
+          </a:prstGeom>
+          <a:solidFill>
+            <a:srgbClr val="D3CBB6">
+              <a:alpha val="89804"/>
+            </a:srgbClr>
+          </a:solidFill>
+        </p:spPr>
+        <p:txBody>
+          <a:bodyPr wrap="square" lIns="274320" tIns="182880" rIns="274320" bIns="182880" rtlCol="0">
+            <a:spAutoFit/>
+          </a:bodyPr>
+          <a:lstStyle>
+            <a:defPPr>
+              <a:defRPr lang="en-US"/>
+            </a:defPPr>
+            <a:lvl1pPr algn="just">
+              <a:defRPr sz="3600">
+                <a:latin typeface="Calibri" panose="020F0502020204030204" pitchFamily="34" charset="0"/>
+              </a:defRPr>
+            </a:lvl1pPr>
+          </a:lstStyle>
+          <a:p>
+            <a:pPr algn="l"/>
+            <a:r>
+              <a:rPr lang="en-US" sz="2800" dirty="0"/>
+              <a:t>The stager sends a map task for each key in the </a:t>
+            </a:r>
+            <a:r>
+              <a:rPr lang="en-US" sz="2800" dirty="0" err="1"/>
+              <a:t>keyfile</a:t>
+            </a:r>
+            <a:r>
+              <a:rPr lang="en-US" sz="2800" dirty="0"/>
+              <a:t>. In </a:t>
+            </a:r>
+            <a:r>
+              <a:rPr lang="en-US" sz="2800" dirty="0" smtClean="0"/>
+              <a:t>larger networks</a:t>
+            </a:r>
+            <a:r>
+              <a:rPr lang="en-US" sz="2800" dirty="0"/>
+              <a:t>, this </a:t>
+            </a:r>
+            <a:r>
+              <a:rPr lang="en-US" sz="2800" dirty="0" smtClean="0"/>
+              <a:t>process is streamlined </a:t>
+            </a:r>
+            <a:r>
+              <a:rPr lang="en-US" sz="2800" dirty="0"/>
+              <a:t>by recursively bundling keys and </a:t>
+            </a:r>
+            <a:r>
+              <a:rPr lang="en-US" sz="2800" dirty="0" smtClean="0"/>
+              <a:t>sending them </a:t>
+            </a:r>
+            <a:r>
+              <a:rPr lang="en-US" sz="2800" dirty="0"/>
+              <a:t>to the best finger.</a:t>
+            </a:r>
+            <a:endParaRPr lang="en-US" sz="2800" dirty="0"/>
+          </a:p>
+        </p:txBody>
+      </p:sp>
+      <p:sp>
+        <p:nvSpPr>
+          <p:cNvPr id="25" name="TextBox 24"/>
+          <p:cNvSpPr txBox="1"/>
+          <p:nvPr/>
+        </p:nvSpPr>
+        <p:spPr>
+          <a:xfrm>
+            <a:off x="18686856" y="26238378"/>
+            <a:ext cx="5273273" cy="2792254"/>
+          </a:xfrm>
+          <a:prstGeom prst="roundRect">
+            <a:avLst/>
+          </a:prstGeom>
+          <a:solidFill>
+            <a:srgbClr val="D3CBB6">
+              <a:alpha val="89804"/>
+            </a:srgbClr>
+          </a:solidFill>
+        </p:spPr>
+        <p:txBody>
+          <a:bodyPr wrap="square" lIns="274320" tIns="182880" rIns="274320" bIns="182880" rtlCol="0">
+            <a:spAutoFit/>
+          </a:bodyPr>
+          <a:lstStyle>
+            <a:defPPr>
+              <a:defRPr lang="en-US"/>
+            </a:defPPr>
+            <a:lvl1pPr algn="just">
+              <a:defRPr sz="3600">
+                <a:latin typeface="Calibri" panose="020F0502020204030204" pitchFamily="34" charset="0"/>
+              </a:defRPr>
+            </a:lvl1pPr>
+          </a:lstStyle>
+          <a:p>
+            <a:pPr algn="l"/>
+            <a:r>
+              <a:rPr lang="en-US" sz="2800" dirty="0" smtClean="0"/>
+              <a:t>Results </a:t>
+            </a:r>
+            <a:r>
+              <a:rPr lang="en-US" sz="2800" dirty="0"/>
+              <a:t>are sent back via </a:t>
+            </a:r>
+            <a:r>
+              <a:rPr lang="en-US" sz="2800" dirty="0" smtClean="0"/>
+              <a:t>the Chord </a:t>
+            </a:r>
+            <a:r>
+              <a:rPr lang="en-US" sz="2800" dirty="0"/>
+              <a:t>overlay. If a node receives </a:t>
+            </a:r>
+            <a:r>
+              <a:rPr lang="en-US" sz="2800" dirty="0" smtClean="0"/>
+              <a:t>multiple results</a:t>
+            </a:r>
+            <a:r>
+              <a:rPr lang="en-US" sz="2800" dirty="0"/>
+              <a:t>, they are </a:t>
+            </a:r>
+            <a:r>
+              <a:rPr lang="en-US" sz="2800" dirty="0" smtClean="0"/>
+              <a:t>reduced </a:t>
+            </a:r>
+            <a:r>
+              <a:rPr lang="en-US" sz="2800" dirty="0"/>
+              <a:t>before being sent on.</a:t>
+            </a:r>
+            <a:endParaRPr lang="en-US" sz="2800" dirty="0"/>
+          </a:p>
+        </p:txBody>
+      </p:sp>
+      <mc:AlternateContent xmlns:mc="http://schemas.openxmlformats.org/markup-compatibility/2006">
+        <mc:Choice xmlns:a14="http://schemas.microsoft.com/office/drawing/2010/main" Requires="a14">
+          <p:sp>
+            <p:nvSpPr>
+              <p:cNvPr id="26" name="TextBox 25"/>
+              <p:cNvSpPr txBox="1"/>
+              <p:nvPr/>
+            </p:nvSpPr>
+            <p:spPr>
+              <a:xfrm>
+                <a:off x="24860154" y="15785445"/>
+                <a:ext cx="7781542" cy="2606671"/>
+              </a:xfrm>
+              <a:prstGeom prst="roundRect">
+                <a:avLst/>
+              </a:prstGeom>
+              <a:solidFill>
+                <a:srgbClr val="D3CBB6">
+                  <a:alpha val="89804"/>
+                </a:srgbClr>
+              </a:solidFill>
+            </p:spPr>
+            <p:txBody>
+              <a:bodyPr wrap="square" lIns="274320" tIns="182880" rIns="274320" bIns="182880" rtlCol="0">
+                <a:spAutoFit/>
+              </a:bodyPr>
+              <a:lstStyle>
+                <a:defPPr>
+                  <a:defRPr lang="en-US"/>
+                </a:defPPr>
+                <a:lvl1pPr algn="just">
+                  <a:defRPr sz="3600">
+                    <a:latin typeface="Calibri" panose="020F0502020204030204" pitchFamily="34" charset="0"/>
+                  </a:defRPr>
+                </a:lvl1pPr>
+              </a:lstStyle>
+              <a:p>
+                <a:r>
+                  <a:rPr lang="en-US" sz="2000" dirty="0" smtClean="0"/>
+                  <a:t>For a sufficiently large job, it was almost always preferable to distribute </a:t>
+                </a:r>
+                <a:r>
+                  <a:rPr lang="en-US" sz="2000" dirty="0"/>
+                  <a:t>it. When the job is too small, such as with the </a:t>
+                </a:r>
+                <a:r>
+                  <a:rPr lang="en-US" sz="2000" dirty="0" smtClean="0"/>
+                  <a:t>10</a:t>
+                </a:r>
+                <a:r>
+                  <a:rPr lang="en-US" sz="2000" baseline="30000" dirty="0" smtClean="0"/>
+                  <a:t>8</a:t>
+                </a:r>
+                <a:r>
+                  <a:rPr lang="en-US" sz="2000" dirty="0" smtClean="0"/>
+                  <a:t> </a:t>
+                </a:r>
+                <a:r>
+                  <a:rPr lang="en-US" sz="2000" dirty="0"/>
+                  <a:t>data </a:t>
+                </a:r>
+                <a:r>
+                  <a:rPr lang="en-US" sz="2000" dirty="0" smtClean="0"/>
+                  <a:t>set, our </a:t>
+                </a:r>
+                <a:r>
+                  <a:rPr lang="en-US" sz="2000" dirty="0"/>
+                  <a:t>runtime is dominated by the overhead. Our results are what we </a:t>
+                </a:r>
+                <a:r>
+                  <a:rPr lang="en-US" sz="2000" dirty="0" smtClean="0"/>
+                  <a:t>would expect </a:t>
+                </a:r>
+                <a:r>
+                  <a:rPr lang="en-US" sz="2000" dirty="0"/>
+                  <a:t>when overhead grows logarithmically to the number of workers</a:t>
+                </a:r>
+                <a:r>
+                  <a:rPr lang="en-US" sz="2000" dirty="0" smtClean="0"/>
+                  <a:t>.  Runtime is summarized by the following:</a:t>
+                </a:r>
+              </a:p>
+              <a:p>
+                <a:r>
+                  <a:rPr lang="en-US" sz="2000" dirty="0" smtClean="0"/>
+                  <a:t> </a:t>
+                </a:r>
+                <a14:m>
+                  <m:oMath xmlns:m="http://schemas.openxmlformats.org/officeDocument/2006/math">
+                    <m:r>
+                      <a:rPr lang="en-US" sz="2000" b="0" i="1" smtClean="0">
+                        <a:latin typeface="Cambria Math" panose="02040503050406030204" pitchFamily="18" charset="0"/>
+                      </a:rPr>
+                      <m:t>𝑟𝑢𝑛𝑡𝑖𝑚𝑒</m:t>
+                    </m:r>
+                    <m:r>
+                      <a:rPr lang="en-US" sz="2000" b="0" i="1" smtClean="0">
+                        <a:latin typeface="Cambria Math" panose="02040503050406030204" pitchFamily="18" charset="0"/>
+                        <a:ea typeface="Cambria Math" panose="02040503050406030204" pitchFamily="18" charset="0"/>
+                      </a:rPr>
+                      <m:t>≈</m:t>
+                    </m:r>
+                    <m:f>
+                      <m:fPr>
+                        <m:ctrlPr>
+                          <a:rPr lang="en-US" sz="2000" b="0" i="1" smtClean="0">
+                            <a:latin typeface="Cambria Math" panose="02040503050406030204" pitchFamily="18" charset="0"/>
+                          </a:rPr>
+                        </m:ctrlPr>
+                      </m:fPr>
+                      <m:num>
+                        <m:r>
+                          <a:rPr lang="en-US" sz="2000" b="0" i="1" smtClean="0">
+                            <a:latin typeface="Cambria Math" panose="02040503050406030204" pitchFamily="18" charset="0"/>
+                          </a:rPr>
+                          <m:t>𝑏𝑎𝑠𝑒𝑅𝑢𝑛𝑡𝑖𝑚𝑒</m:t>
+                        </m:r>
+                      </m:num>
+                      <m:den>
+                        <m:r>
+                          <a:rPr lang="en-US" sz="2000" b="0" i="1" smtClean="0">
+                            <a:latin typeface="Cambria Math" panose="02040503050406030204" pitchFamily="18" charset="0"/>
+                          </a:rPr>
+                          <m:t>𝑛𝑢𝑚𝑊𝑜𝑟𝑘𝑒𝑟𝑠</m:t>
+                        </m:r>
+                      </m:den>
+                    </m:f>
+                    <m:r>
+                      <a:rPr lang="en-US" sz="2000" b="0" i="1" smtClean="0">
+                        <a:latin typeface="Cambria Math" panose="02040503050406030204" pitchFamily="18" charset="0"/>
+                      </a:rPr>
+                      <m:t>+</m:t>
+                    </m:r>
+                    <m:r>
+                      <a:rPr lang="en-US" sz="2000" b="0" i="1" smtClean="0">
+                        <a:latin typeface="Cambria Math" panose="02040503050406030204" pitchFamily="18" charset="0"/>
+                      </a:rPr>
+                      <m:t>𝑜𝑣𝑒𝑟h𝑒𝑎𝑑𝐶𝑜𝑠𝑡</m:t>
+                    </m:r>
+                    <m:r>
+                      <a:rPr lang="en-US" sz="2000" b="0" i="1" smtClean="0">
+                        <a:latin typeface="Cambria Math" panose="02040503050406030204" pitchFamily="18" charset="0"/>
+                      </a:rPr>
+                      <m:t>∗</m:t>
+                    </m:r>
+                    <m:r>
+                      <a:rPr lang="en-US" sz="2000" b="0" i="1" smtClean="0">
+                        <a:latin typeface="Cambria Math" panose="02040503050406030204" pitchFamily="18" charset="0"/>
+                      </a:rPr>
+                      <m:t>𝑛𝑢𝑚𝑊𝑜𝑟𝑘𝑒𝑟𝑠</m:t>
+                    </m:r>
+                  </m:oMath>
+                </a14:m>
+                <a:endParaRPr lang="en-US" sz="2000" dirty="0" smtClean="0"/>
+              </a:p>
+            </p:txBody>
+          </p:sp>
+        </mc:Choice>
+        <mc:Fallback>
+          <p:sp>
+            <p:nvSpPr>
+              <p:cNvPr id="26" name="TextBox 25"/>
+              <p:cNvSpPr txBox="1">
+                <a:spLocks noRot="1" noChangeAspect="1" noMove="1" noResize="1" noEditPoints="1" noAdjustHandles="1" noChangeArrowheads="1" noChangeShapeType="1" noTextEdit="1"/>
+              </p:cNvSpPr>
+              <p:nvPr/>
+            </p:nvSpPr>
+            <p:spPr>
+              <a:xfrm>
+                <a:off x="24860154" y="15785445"/>
+                <a:ext cx="7781542" cy="2606671"/>
+              </a:xfrm>
+              <a:prstGeom prst="roundRect">
+                <a:avLst/>
+              </a:prstGeom>
+              <a:blipFill rotWithShape="0">
+                <a:blip r:embed="rId11"/>
+                <a:stretch>
+                  <a:fillRect/>
+                </a:stretch>
+              </a:blipFill>
+            </p:spPr>
+            <p:txBody>
+              <a:bodyPr/>
+              <a:lstStyle/>
+              <a:p>
+                <a:r>
+                  <a:rPr lang="en-US">
+                    <a:noFill/>
+                  </a:rPr>
+                  <a:t> </a:t>
+                </a:r>
+              </a:p>
+            </p:txBody>
+          </p:sp>
+        </mc:Fallback>
+      </mc:AlternateContent>
+      <p:graphicFrame>
+        <p:nvGraphicFramePr>
+          <p:cNvPr id="27" name="Table 26"/>
+          <p:cNvGraphicFramePr>
+            <a:graphicFrameLocks noGrp="1"/>
+          </p:cNvGraphicFramePr>
+          <p:nvPr>
+            <p:extLst>
+              <p:ext uri="{D42A27DB-BD31-4B8C-83A1-F6EECF244321}">
+                <p14:modId xmlns:p14="http://schemas.microsoft.com/office/powerpoint/2010/main" val="372281412"/>
+              </p:ext>
+            </p:extLst>
+          </p:nvPr>
+        </p:nvGraphicFramePr>
+        <p:xfrm>
+          <a:off x="18928688" y="13015002"/>
+          <a:ext cx="5479071" cy="5186016"/>
+        </p:xfrm>
+        <a:graphic>
+          <a:graphicData uri="http://schemas.openxmlformats.org/drawingml/2006/table">
+            <a:tbl>
+              <a:tblPr firstRow="1" bandRow="1">
+                <a:tableStyleId>{073A0DAA-6AF3-43AB-8588-CEC1D06C72B9}</a:tableStyleId>
+              </a:tblPr>
+              <a:tblGrid>
+                <a:gridCol w="1826357"/>
+                <a:gridCol w="1826357"/>
+                <a:gridCol w="1826357"/>
+              </a:tblGrid>
+              <a:tr h="1008634">
+                <a:tc>
+                  <a:txBody>
+                    <a:bodyPr/>
+                    <a:lstStyle/>
+                    <a:p>
+                      <a:r>
+                        <a:rPr lang="en-US" sz="3200" dirty="0" smtClean="0"/>
+                        <a:t>Churn Rate per second</a:t>
+                      </a:r>
+                      <a:endParaRPr lang="en-US" sz="3200" dirty="0">
+                        <a:latin typeface="Calibri" panose="020F0502020204030204" pitchFamily="34" charset="0"/>
+                      </a:endParaRPr>
+                    </a:p>
+                  </a:txBody>
+                  <a:tcPr/>
+                </a:tc>
+                <a:tc>
+                  <a:txBody>
+                    <a:bodyPr/>
+                    <a:lstStyle/>
+                    <a:p>
+                      <a:r>
+                        <a:rPr lang="en-US" sz="3200" dirty="0" smtClean="0"/>
+                        <a:t>Average</a:t>
+                      </a:r>
+                      <a:r>
+                        <a:rPr lang="en-US" sz="3200" baseline="0" dirty="0" smtClean="0"/>
+                        <a:t> runtime (s)</a:t>
+                      </a:r>
+                      <a:endParaRPr lang="en-US" sz="3200" dirty="0">
+                        <a:latin typeface="Calibri" panose="020F0502020204030204" pitchFamily="34" charset="0"/>
+                      </a:endParaRPr>
+                    </a:p>
+                  </a:txBody>
+                  <a:tcPr/>
+                </a:tc>
+                <a:tc>
+                  <a:txBody>
+                    <a:bodyPr/>
+                    <a:lstStyle/>
+                    <a:p>
+                      <a:r>
+                        <a:rPr lang="en-US" sz="3200" dirty="0" smtClean="0"/>
+                        <a:t>Speedup</a:t>
+                      </a:r>
+                      <a:r>
+                        <a:rPr lang="en-US" sz="3200" baseline="0" dirty="0" smtClean="0"/>
+                        <a:t> vs 0% Churn</a:t>
+                      </a:r>
+                      <a:endParaRPr lang="en-US" sz="3200" dirty="0">
+                        <a:latin typeface="Calibri" panose="020F0502020204030204" pitchFamily="34" charset="0"/>
+                      </a:endParaRPr>
+                    </a:p>
+                  </a:txBody>
+                  <a:tcPr/>
+                </a:tc>
+              </a:tr>
+              <a:tr h="605256">
+                <a:tc>
+                  <a:txBody>
+                    <a:bodyPr/>
+                    <a:lstStyle/>
+                    <a:p>
+                      <a:pPr algn="r"/>
+                      <a:r>
+                        <a:rPr lang="en-US" sz="3200" dirty="0" smtClean="0">
+                          <a:latin typeface="Calibri" panose="020F0502020204030204" pitchFamily="34" charset="0"/>
+                        </a:rPr>
+                        <a:t>0%</a:t>
+                      </a:r>
+                      <a:endParaRPr lang="en-US" sz="3200" dirty="0">
+                        <a:latin typeface="Calibri" panose="020F0502020204030204" pitchFamily="34" charset="0"/>
+                      </a:endParaRPr>
+                    </a:p>
+                  </a:txBody>
+                  <a:tcPr/>
+                </a:tc>
+                <a:tc>
+                  <a:txBody>
+                    <a:bodyPr/>
+                    <a:lstStyle/>
+                    <a:p>
+                      <a:pPr algn="r"/>
+                      <a:r>
+                        <a:rPr lang="en-US" sz="3200" dirty="0" smtClean="0">
+                          <a:latin typeface="Calibri" panose="020F0502020204030204" pitchFamily="34" charset="0"/>
+                        </a:rPr>
+                        <a:t>441.577</a:t>
+                      </a:r>
+                      <a:endParaRPr lang="en-US" sz="3200" dirty="0">
+                        <a:latin typeface="Calibri" panose="020F0502020204030204" pitchFamily="34" charset="0"/>
+                      </a:endParaRPr>
+                    </a:p>
+                  </a:txBody>
+                  <a:tcPr/>
+                </a:tc>
+                <a:tc>
+                  <a:txBody>
+                    <a:bodyPr/>
+                    <a:lstStyle/>
+                    <a:p>
+                      <a:pPr algn="r"/>
+                      <a:r>
+                        <a:rPr lang="en-US" sz="3200" dirty="0" smtClean="0">
+                          <a:latin typeface="Calibri" panose="020F0502020204030204" pitchFamily="34" charset="0"/>
+                        </a:rPr>
+                        <a:t>1.00</a:t>
+                      </a:r>
+                      <a:endParaRPr lang="en-US" sz="3200" dirty="0">
+                        <a:latin typeface="Calibri" panose="020F0502020204030204" pitchFamily="34" charset="0"/>
+                      </a:endParaRPr>
+                    </a:p>
+                  </a:txBody>
+                  <a:tcPr/>
+                </a:tc>
+              </a:tr>
+              <a:tr h="605256">
+                <a:tc>
+                  <a:txBody>
+                    <a:bodyPr/>
+                    <a:lstStyle/>
+                    <a:p>
+                      <a:pPr algn="r"/>
+                      <a:r>
+                        <a:rPr lang="en-US" sz="3200" dirty="0" smtClean="0">
+                          <a:latin typeface="Calibri" panose="020F0502020204030204" pitchFamily="34" charset="0"/>
+                        </a:rPr>
+                        <a:t>0.0025%</a:t>
+                      </a:r>
+                      <a:endParaRPr lang="en-US" sz="3200" dirty="0">
+                        <a:latin typeface="Calibri" panose="020F0502020204030204" pitchFamily="34" charset="0"/>
+                      </a:endParaRPr>
+                    </a:p>
+                  </a:txBody>
+                  <a:tcPr/>
+                </a:tc>
+                <a:tc>
+                  <a:txBody>
+                    <a:bodyPr/>
+                    <a:lstStyle/>
+                    <a:p>
+                      <a:pPr algn="r"/>
+                      <a:r>
+                        <a:rPr lang="en-US" sz="3200" dirty="0" smtClean="0">
+                          <a:latin typeface="Calibri" panose="020F0502020204030204" pitchFamily="34" charset="0"/>
+                        </a:rPr>
+                        <a:t>331.80</a:t>
+                      </a:r>
+                      <a:endParaRPr lang="en-US" sz="3200" dirty="0">
+                        <a:latin typeface="Calibri" panose="020F0502020204030204" pitchFamily="34" charset="0"/>
+                      </a:endParaRPr>
+                    </a:p>
+                  </a:txBody>
+                  <a:tcPr/>
+                </a:tc>
+                <a:tc>
+                  <a:txBody>
+                    <a:bodyPr/>
+                    <a:lstStyle/>
+                    <a:p>
+                      <a:pPr algn="r"/>
+                      <a:r>
+                        <a:rPr lang="en-US" sz="3200" dirty="0" smtClean="0">
+                          <a:latin typeface="Calibri" panose="020F0502020204030204" pitchFamily="34" charset="0"/>
+                        </a:rPr>
+                        <a:t>1.24</a:t>
+                      </a:r>
+                      <a:endParaRPr lang="en-US" sz="3200" dirty="0">
+                        <a:latin typeface="Calibri" panose="020F0502020204030204" pitchFamily="34" charset="0"/>
+                      </a:endParaRPr>
+                    </a:p>
+                  </a:txBody>
+                  <a:tcPr/>
+                </a:tc>
+              </a:tr>
+              <a:tr h="605256">
+                <a:tc>
+                  <a:txBody>
+                    <a:bodyPr/>
+                    <a:lstStyle/>
+                    <a:p>
+                      <a:pPr algn="r"/>
+                      <a:r>
+                        <a:rPr lang="en-US" sz="3200" dirty="0" smtClean="0">
+                          <a:latin typeface="Calibri" panose="020F0502020204030204" pitchFamily="34" charset="0"/>
+                        </a:rPr>
+                        <a:t>0.00775%</a:t>
+                      </a:r>
+                    </a:p>
+                  </a:txBody>
+                  <a:tcPr/>
+                </a:tc>
+                <a:tc>
+                  <a:txBody>
+                    <a:bodyPr/>
+                    <a:lstStyle/>
+                    <a:p>
+                      <a:pPr algn="r"/>
+                      <a:r>
+                        <a:rPr lang="en-US" sz="3200" dirty="0" smtClean="0">
+                          <a:latin typeface="Calibri" panose="020F0502020204030204" pitchFamily="34" charset="0"/>
+                        </a:rPr>
+                        <a:t>445.47</a:t>
+                      </a:r>
+                      <a:endParaRPr lang="en-US" sz="3200" dirty="0">
+                        <a:latin typeface="Calibri" panose="020F0502020204030204" pitchFamily="34" charset="0"/>
+                      </a:endParaRPr>
+                    </a:p>
+                  </a:txBody>
+                  <a:tcPr/>
+                </a:tc>
+                <a:tc>
+                  <a:txBody>
+                    <a:bodyPr/>
+                    <a:lstStyle/>
+                    <a:p>
+                      <a:pPr algn="r"/>
+                      <a:r>
+                        <a:rPr lang="en-US" sz="3200" dirty="0" smtClean="0">
+                          <a:latin typeface="Calibri" panose="020F0502020204030204" pitchFamily="34" charset="0"/>
+                        </a:rPr>
+                        <a:t>0.92</a:t>
+                      </a:r>
+                      <a:endParaRPr lang="en-US" sz="3200" dirty="0">
+                        <a:latin typeface="Calibri" panose="020F0502020204030204" pitchFamily="34" charset="0"/>
+                      </a:endParaRPr>
+                    </a:p>
+                  </a:txBody>
+                  <a:tcPr/>
+                </a:tc>
+              </a:tr>
+              <a:tr h="605256">
+                <a:tc>
+                  <a:txBody>
+                    <a:bodyPr/>
+                    <a:lstStyle/>
+                    <a:p>
+                      <a:pPr algn="r"/>
+                      <a:r>
+                        <a:rPr lang="en-US" sz="3200" dirty="0" smtClean="0">
+                          <a:latin typeface="Calibri" panose="020F0502020204030204" pitchFamily="34" charset="0"/>
+                        </a:rPr>
+                        <a:t>0.025%</a:t>
+                      </a:r>
+                    </a:p>
+                  </a:txBody>
+                  <a:tcPr/>
+                </a:tc>
+                <a:tc>
+                  <a:txBody>
+                    <a:bodyPr/>
+                    <a:lstStyle/>
+                    <a:p>
+                      <a:pPr algn="r"/>
+                      <a:r>
+                        <a:rPr lang="en-US" sz="3200" dirty="0" smtClean="0">
+                          <a:latin typeface="Calibri" panose="020F0502020204030204" pitchFamily="34" charset="0"/>
+                        </a:rPr>
+                        <a:t>431.86</a:t>
+                      </a:r>
+                      <a:endParaRPr lang="en-US" sz="3200" dirty="0">
+                        <a:latin typeface="Calibri" panose="020F0502020204030204" pitchFamily="34" charset="0"/>
+                      </a:endParaRPr>
+                    </a:p>
+                  </a:txBody>
+                  <a:tcPr/>
+                </a:tc>
+                <a:tc>
+                  <a:txBody>
+                    <a:bodyPr/>
+                    <a:lstStyle/>
+                    <a:p>
+                      <a:pPr algn="r"/>
+                      <a:r>
+                        <a:rPr lang="en-US" sz="3200" dirty="0" smtClean="0">
+                          <a:latin typeface="Calibri" panose="020F0502020204030204" pitchFamily="34" charset="0"/>
+                        </a:rPr>
+                        <a:t>0.95</a:t>
+                      </a:r>
+                      <a:endParaRPr lang="en-US" sz="3200" dirty="0">
+                        <a:latin typeface="Calibri" panose="020F0502020204030204" pitchFamily="34" charset="0"/>
+                      </a:endParaRPr>
+                    </a:p>
+                  </a:txBody>
+                  <a:tcPr/>
+                </a:tc>
+              </a:tr>
+              <a:tr h="605256">
+                <a:tc>
+                  <a:txBody>
+                    <a:bodyPr/>
+                    <a:lstStyle/>
+                    <a:p>
+                      <a:pPr algn="r"/>
+                      <a:r>
+                        <a:rPr lang="en-US" sz="3200" dirty="0" smtClean="0">
+                          <a:latin typeface="Calibri" panose="020F0502020204030204" pitchFamily="34" charset="0"/>
+                        </a:rPr>
+                        <a:t>0.4%</a:t>
+                      </a:r>
+                    </a:p>
+                  </a:txBody>
+                  <a:tcPr/>
+                </a:tc>
+                <a:tc>
+                  <a:txBody>
+                    <a:bodyPr/>
+                    <a:lstStyle/>
+                    <a:p>
+                      <a:pPr algn="r"/>
+                      <a:r>
+                        <a:rPr lang="en-US" sz="3200" dirty="0" smtClean="0">
+                          <a:latin typeface="Calibri" panose="020F0502020204030204" pitchFamily="34" charset="0"/>
+                        </a:rPr>
+                        <a:t>329.20</a:t>
+                      </a:r>
+                      <a:endParaRPr lang="en-US" sz="3200" dirty="0">
+                        <a:latin typeface="Calibri" panose="020F0502020204030204" pitchFamily="34" charset="0"/>
+                      </a:endParaRPr>
+                    </a:p>
+                  </a:txBody>
+                  <a:tcPr/>
+                </a:tc>
+                <a:tc>
+                  <a:txBody>
+                    <a:bodyPr/>
+                    <a:lstStyle/>
+                    <a:p>
+                      <a:pPr algn="r"/>
+                      <a:r>
+                        <a:rPr lang="en-US" sz="3200" dirty="0" smtClean="0">
+                          <a:latin typeface="Calibri" panose="020F0502020204030204" pitchFamily="34" charset="0"/>
+                        </a:rPr>
+                        <a:t>1.25</a:t>
+                      </a:r>
+                      <a:endParaRPr lang="en-US" sz="3200" dirty="0">
+                        <a:latin typeface="Calibri" panose="020F0502020204030204" pitchFamily="34" charset="0"/>
+                      </a:endParaRPr>
+                    </a:p>
+                  </a:txBody>
+                  <a:tcPr/>
+                </a:tc>
+              </a:tr>
+              <a:tr h="605256">
+                <a:tc>
+                  <a:txBody>
+                    <a:bodyPr/>
+                    <a:lstStyle/>
+                    <a:p>
+                      <a:pPr algn="r"/>
+                      <a:r>
+                        <a:rPr lang="en-US" sz="3200" dirty="0" smtClean="0">
+                          <a:latin typeface="Calibri" panose="020F0502020204030204" pitchFamily="34" charset="0"/>
+                        </a:rPr>
+                        <a:t>0.8%</a:t>
+                      </a:r>
+                    </a:p>
+                  </a:txBody>
+                  <a:tcPr/>
+                </a:tc>
+                <a:tc>
+                  <a:txBody>
+                    <a:bodyPr/>
+                    <a:lstStyle/>
+                    <a:p>
+                      <a:pPr algn="r"/>
+                      <a:r>
+                        <a:rPr lang="en-US" sz="3200" dirty="0" smtClean="0">
+                          <a:latin typeface="Calibri" panose="020F0502020204030204" pitchFamily="34" charset="0"/>
+                        </a:rPr>
+                        <a:t>191.25</a:t>
+                      </a:r>
+                      <a:endParaRPr lang="en-US" sz="3200" dirty="0">
+                        <a:latin typeface="Calibri" panose="020F0502020204030204" pitchFamily="34" charset="0"/>
+                      </a:endParaRPr>
+                    </a:p>
+                  </a:txBody>
+                  <a:tcPr/>
+                </a:tc>
+                <a:tc>
+                  <a:txBody>
+                    <a:bodyPr/>
+                    <a:lstStyle/>
+                    <a:p>
+                      <a:pPr algn="r"/>
+                      <a:r>
+                        <a:rPr lang="en-US" sz="3200" dirty="0" smtClean="0">
+                          <a:latin typeface="Calibri" panose="020F0502020204030204" pitchFamily="34" charset="0"/>
+                        </a:rPr>
+                        <a:t>2.15</a:t>
+                      </a:r>
+                      <a:endParaRPr lang="en-US" sz="3200" dirty="0">
+                        <a:latin typeface="Calibri" panose="020F0502020204030204" pitchFamily="34" charset="0"/>
+                      </a:endParaRPr>
+                    </a:p>
+                  </a:txBody>
+                  <a:tcPr/>
+                </a:tc>
+              </a:tr>
+            </a:tbl>
+          </a:graphicData>
+        </a:graphic>
+      </p:graphicFrame>
+      <p:sp>
+        <p:nvSpPr>
+          <p:cNvPr id="29" name="TextBox 28"/>
+          <p:cNvSpPr txBox="1"/>
+          <p:nvPr/>
+        </p:nvSpPr>
+        <p:spPr>
+          <a:xfrm>
+            <a:off x="19179746" y="18392116"/>
+            <a:ext cx="5099743" cy="2451735"/>
+          </a:xfrm>
+          <a:prstGeom prst="roundRect">
+            <a:avLst/>
+          </a:prstGeom>
+          <a:solidFill>
+            <a:srgbClr val="D3CBB6">
+              <a:alpha val="89804"/>
+            </a:srgbClr>
+          </a:solidFill>
+        </p:spPr>
+        <p:txBody>
+          <a:bodyPr wrap="square" lIns="274320" tIns="182880" rIns="274320" bIns="182880" rtlCol="0">
+            <a:spAutoFit/>
+          </a:bodyPr>
+          <a:lstStyle>
+            <a:defPPr>
+              <a:defRPr lang="en-US"/>
+            </a:defPPr>
+            <a:lvl1pPr algn="just">
+              <a:defRPr sz="3600">
+                <a:latin typeface="Calibri" panose="020F0502020204030204" pitchFamily="34" charset="0"/>
+              </a:defRPr>
+            </a:lvl1pPr>
+          </a:lstStyle>
+          <a:p>
+            <a:r>
+              <a:rPr lang="en-US" sz="2000" dirty="0"/>
+              <a:t> The results of calculating π by generating 10 8 samples </a:t>
+            </a:r>
+            <a:r>
+              <a:rPr lang="en-US" sz="2000" dirty="0" smtClean="0"/>
+              <a:t>under churn</a:t>
+            </a:r>
+            <a:r>
+              <a:rPr lang="en-US" sz="2000" dirty="0"/>
+              <a:t>. Churn is the chance for each node to join or leave the </a:t>
+            </a:r>
+            <a:r>
+              <a:rPr lang="en-US" sz="2000" dirty="0" smtClean="0"/>
+              <a:t>network. The </a:t>
+            </a:r>
+            <a:r>
+              <a:rPr lang="en-US" sz="2000" dirty="0"/>
+              <a:t>large speedup is from joining nodes acquiring work </a:t>
+            </a:r>
+            <a:r>
+              <a:rPr lang="en-US" sz="2000" dirty="0" smtClean="0"/>
+              <a:t>during experimental </a:t>
+            </a:r>
+            <a:r>
+              <a:rPr lang="en-US" sz="2000" dirty="0"/>
+              <a:t>runtime.</a:t>
+            </a:r>
+            <a:endParaRPr lang="en-US" sz="2000" dirty="0" smtClean="0"/>
           </a:p>
         </p:txBody>
       </p:sp>
@@ -6342,4 +8044,265 @@
   <a:objectDefaults/>
   <a:extraClrSchemeLst/>
 </a:theme>
+</file>
+
+<file path=ppt/theme/theme2.xml><?xml version="1.0" encoding="utf-8"?>
+<a:theme xmlns:a="http://schemas.openxmlformats.org/drawingml/2006/main" name="Office Theme">
+  <a:themeElements>
+    <a:clrScheme name="Office">
+      <a:dk1>
+        <a:sysClr val="windowText" lastClr="000000"/>
+      </a:dk1>
+      <a:lt1>
+        <a:sysClr val="window" lastClr="FFFFFF"/>
+      </a:lt1>
+      <a:dk2>
+        <a:srgbClr val="44546A"/>
+      </a:dk2>
+      <a:lt2>
+        <a:srgbClr val="E7E6E6"/>
+      </a:lt2>
+      <a:accent1>
+        <a:srgbClr val="5B9BD5"/>
+      </a:accent1>
+      <a:accent2>
+        <a:srgbClr val="ED7D31"/>
+      </a:accent2>
+      <a:accent3>
+        <a:srgbClr val="A5A5A5"/>
+      </a:accent3>
+      <a:accent4>
+        <a:srgbClr val="FFC000"/>
+      </a:accent4>
+      <a:accent5>
+        <a:srgbClr val="4472C4"/>
+      </a:accent5>
+      <a:accent6>
+        <a:srgbClr val="70AD47"/>
+      </a:accent6>
+      <a:hlink>
+        <a:srgbClr val="0563C1"/>
+      </a:hlink>
+      <a:folHlink>
+        <a:srgbClr val="954F72"/>
+      </a:folHlink>
+    </a:clrScheme>
+    <a:fontScheme name="Office">
+      <a:majorFont>
+        <a:latin typeface="Calibri Light" panose="020F0302020204030204"/>
+        <a:ea typeface=""/>
+        <a:cs typeface=""/>
+        <a:font script="Jpan" typeface="ＭＳ Ｐゴシック"/>
+        <a:font script="Hang" typeface="맑은 고딕"/>
+        <a:font script="Hans" typeface="宋体"/>
+        <a:font script="Hant" typeface="新細明體"/>
+        <a:font script="Arab" typeface="Times New Roman"/>
+        <a:font script="Hebr" typeface="Times New Roman"/>
+        <a:font script="Thai" typeface="Angsana New"/>
+        <a:font script="Ethi" typeface="Nyala"/>
+        <a:font script="Beng" typeface="Vrinda"/>
+        <a:font script="Gujr" typeface="Shruti"/>
+        <a:font script="Khmr" typeface="MoolBoran"/>
+        <a:font script="Knda" typeface="Tunga"/>
+        <a:font script="Guru" typeface="Raavi"/>
+        <a:font script="Cans" typeface="Euphemia"/>
+        <a:font script="Cher" typeface="Plantagenet Cherokee"/>
+        <a:font script="Yiii" typeface="Microsoft Yi Baiti"/>
+        <a:font script="Tibt" typeface="Microsoft Himalaya"/>
+        <a:font script="Thaa" typeface="MV Boli"/>
+        <a:font script="Deva" typeface="Mangal"/>
+        <a:font script="Telu" typeface="Gautami"/>
+        <a:font script="Taml" typeface="Latha"/>
+        <a:font script="Syrc" typeface="Estrangelo Edessa"/>
+        <a:font script="Orya" typeface="Kalinga"/>
+        <a:font script="Mlym" typeface="Kartika"/>
+        <a:font script="Laoo" typeface="DokChampa"/>
+        <a:font script="Sinh" typeface="Iskoola Pota"/>
+        <a:font script="Mong" typeface="Mongolian Baiti"/>
+        <a:font script="Viet" typeface="Times New Roman"/>
+        <a:font script="Uigh" typeface="Microsoft Uighur"/>
+        <a:font script="Geor" typeface="Sylfaen"/>
+      </a:majorFont>
+      <a:minorFont>
+        <a:latin typeface="Calibri" panose="020F0502020204030204"/>
+        <a:ea typeface=""/>
+        <a:cs typeface=""/>
+        <a:font script="Jpan" typeface="ＭＳ Ｐゴシック"/>
+        <a:font script="Hang" typeface="맑은 고딕"/>
+        <a:font script="Hans" typeface="宋体"/>
+        <a:font script="Hant" typeface="新細明體"/>
+        <a:font script="Arab" typeface="Arial"/>
+        <a:font script="Hebr" typeface="Arial"/>
+        <a:font script="Thai" typeface="Cordia New"/>
+        <a:font script="Ethi" typeface="Nyala"/>
+        <a:font script="Beng" typeface="Vrinda"/>
+        <a:font script="Gujr" typeface="Shruti"/>
+        <a:font script="Khmr" typeface="DaunPenh"/>
+        <a:font script="Knda" typeface="Tunga"/>
+        <a:font script="Guru" typeface="Raavi"/>
+        <a:font script="Cans" typeface="Euphemia"/>
+        <a:font script="Cher" typeface="Plantagenet Cherokee"/>
+        <a:font script="Yiii" typeface="Microsoft Yi Baiti"/>
+        <a:font script="Tibt" typeface="Microsoft Himalaya"/>
+        <a:font script="Thaa" typeface="MV Boli"/>
+        <a:font script="Deva" typeface="Mangal"/>
+        <a:font script="Telu" typeface="Gautami"/>
+        <a:font script="Taml" typeface="Latha"/>
+        <a:font script="Syrc" typeface="Estrangelo Edessa"/>
+        <a:font script="Orya" typeface="Kalinga"/>
+        <a:font script="Mlym" typeface="Kartika"/>
+        <a:font script="Laoo" typeface="DokChampa"/>
+        <a:font script="Sinh" typeface="Iskoola Pota"/>
+        <a:font script="Mong" typeface="Mongolian Baiti"/>
+        <a:font script="Viet" typeface="Arial"/>
+        <a:font script="Uigh" typeface="Microsoft Uighur"/>
+        <a:font script="Geor" typeface="Sylfaen"/>
+      </a:minorFont>
+    </a:fontScheme>
+    <a:fmtScheme name="Office">
+      <a:fillStyleLst>
+        <a:solidFill>
+          <a:schemeClr val="phClr"/>
+        </a:solidFill>
+        <a:gradFill rotWithShape="1">
+          <a:gsLst>
+            <a:gs pos="0">
+              <a:schemeClr val="phClr">
+                <a:lumMod val="110000"/>
+                <a:satMod val="105000"/>
+                <a:tint val="67000"/>
+              </a:schemeClr>
+            </a:gs>
+            <a:gs pos="50000">
+              <a:schemeClr val="phClr">
+                <a:lumMod val="105000"/>
+                <a:satMod val="103000"/>
+                <a:tint val="73000"/>
+              </a:schemeClr>
+            </a:gs>
+            <a:gs pos="100000">
+              <a:schemeClr val="phClr">
+                <a:lumMod val="105000"/>
+                <a:satMod val="109000"/>
+                <a:tint val="81000"/>
+              </a:schemeClr>
+            </a:gs>
+          </a:gsLst>
+          <a:lin ang="5400000" scaled="0"/>
+        </a:gradFill>
+        <a:gradFill rotWithShape="1">
+          <a:gsLst>
+            <a:gs pos="0">
+              <a:schemeClr val="phClr">
+                <a:satMod val="103000"/>
+                <a:lumMod val="102000"/>
+                <a:tint val="94000"/>
+              </a:schemeClr>
+            </a:gs>
+            <a:gs pos="50000">
+              <a:schemeClr val="phClr">
+                <a:satMod val="110000"/>
+                <a:lumMod val="100000"/>
+                <a:shade val="100000"/>
+              </a:schemeClr>
+            </a:gs>
+            <a:gs pos="100000">
+              <a:schemeClr val="phClr">
+                <a:lumMod val="99000"/>
+                <a:satMod val="120000"/>
+                <a:shade val="78000"/>
+              </a:schemeClr>
+            </a:gs>
+          </a:gsLst>
+          <a:lin ang="5400000" scaled="0"/>
+        </a:gradFill>
+      </a:fillStyleLst>
+      <a:lnStyleLst>
+        <a:ln w="6350" cap="flat" cmpd="sng" algn="ctr">
+          <a:solidFill>
+            <a:schemeClr val="phClr"/>
+          </a:solidFill>
+          <a:prstDash val="solid"/>
+          <a:miter lim="800000"/>
+        </a:ln>
+        <a:ln w="12700" cap="flat" cmpd="sng" algn="ctr">
+          <a:solidFill>
+            <a:schemeClr val="phClr"/>
+          </a:solidFill>
+          <a:prstDash val="solid"/>
+          <a:miter lim="800000"/>
+        </a:ln>
+        <a:ln w="19050" cap="flat" cmpd="sng" algn="ctr">
+          <a:solidFill>
+            <a:schemeClr val="phClr"/>
+          </a:solidFill>
+          <a:prstDash val="solid"/>
+          <a:miter lim="800000"/>
+        </a:ln>
+      </a:lnStyleLst>
+      <a:effectStyleLst>
+        <a:effectStyle>
+          <a:effectLst/>
+        </a:effectStyle>
+        <a:effectStyle>
+          <a:effectLst/>
+        </a:effectStyle>
+        <a:effectStyle>
+          <a:effectLst>
+            <a:outerShdw blurRad="57150" dist="19050" dir="5400000" algn="ctr" rotWithShape="0">
+              <a:srgbClr val="000000">
+                <a:alpha val="63000"/>
+              </a:srgbClr>
+            </a:outerShdw>
+          </a:effectLst>
+        </a:effectStyle>
+      </a:effectStyleLst>
+      <a:bgFillStyleLst>
+        <a:solidFill>
+          <a:schemeClr val="phClr"/>
+        </a:solidFill>
+        <a:solidFill>
+          <a:schemeClr val="phClr">
+            <a:tint val="95000"/>
+            <a:satMod val="170000"/>
+          </a:schemeClr>
+        </a:solidFill>
+        <a:gradFill rotWithShape="1">
+          <a:gsLst>
+            <a:gs pos="0">
+              <a:schemeClr val="phClr">
+                <a:tint val="93000"/>
+                <a:satMod val="150000"/>
+                <a:shade val="98000"/>
+                <a:lumMod val="102000"/>
+              </a:schemeClr>
+            </a:gs>
+            <a:gs pos="50000">
+              <a:schemeClr val="phClr">
+                <a:tint val="98000"/>
+                <a:satMod val="130000"/>
+                <a:shade val="90000"/>
+                <a:lumMod val="103000"/>
+              </a:schemeClr>
+            </a:gs>
+            <a:gs pos="100000">
+              <a:schemeClr val="phClr">
+                <a:shade val="63000"/>
+                <a:satMod val="120000"/>
+              </a:schemeClr>
+            </a:gs>
+          </a:gsLst>
+          <a:lin ang="5400000" scaled="0"/>
+        </a:gradFill>
+      </a:bgFillStyleLst>
+    </a:fmtScheme>
+  </a:themeElements>
+  <a:objectDefaults/>
+  <a:extraClrSchemeLst/>
+  <a:extLst>
+    <a:ext uri="{05A4C25C-085E-4340-85A3-A5531E510DB2}">
+      <thm15:themeFamily xmlns:thm15="http://schemas.microsoft.com/office/thememl/2012/main" name="Office Theme" id="{62F939B6-93AF-4DB8-9C6B-D6C7DFDC589F}" vid="{4A3C46E8-61CC-4603-A589-7422A47A8E4A}"/>
+    </a:ext>
+  </a:extLst>
+</a:theme>
 </file>
</xml_diff>